<commit_message>
inserted a few images
</commit_message>
<xml_diff>
--- a/pres/Final_Presentation_V02.pptx
+++ b/pres/Final_Presentation_V02.pptx
@@ -10,10 +10,10 @@
     <p:sldMasterId id="2147483697" r:id="rId6"/>
   </p:sldMasterIdLst>
   <p:notesMasterIdLst>
-    <p:notesMasterId r:id="rId30"/>
+    <p:notesMasterId r:id="rId32"/>
   </p:notesMasterIdLst>
   <p:handoutMasterIdLst>
-    <p:handoutMasterId r:id="rId31"/>
+    <p:handoutMasterId r:id="rId33"/>
   </p:handoutMasterIdLst>
   <p:sldIdLst>
     <p:sldId id="403" r:id="rId7"/>
@@ -29,16 +29,18 @@
     <p:sldId id="413" r:id="rId17"/>
     <p:sldId id="405" r:id="rId18"/>
     <p:sldId id="401" r:id="rId19"/>
-    <p:sldId id="408" r:id="rId20"/>
-    <p:sldId id="407" r:id="rId21"/>
-    <p:sldId id="409" r:id="rId22"/>
-    <p:sldId id="371" r:id="rId23"/>
-    <p:sldId id="372" r:id="rId24"/>
-    <p:sldId id="394" r:id="rId25"/>
-    <p:sldId id="379" r:id="rId26"/>
-    <p:sldId id="395" r:id="rId27"/>
-    <p:sldId id="380" r:id="rId28"/>
-    <p:sldId id="381" r:id="rId29"/>
+    <p:sldId id="414" r:id="rId20"/>
+    <p:sldId id="408" r:id="rId21"/>
+    <p:sldId id="407" r:id="rId22"/>
+    <p:sldId id="409" r:id="rId23"/>
+    <p:sldId id="415" r:id="rId24"/>
+    <p:sldId id="371" r:id="rId25"/>
+    <p:sldId id="372" r:id="rId26"/>
+    <p:sldId id="394" r:id="rId27"/>
+    <p:sldId id="379" r:id="rId28"/>
+    <p:sldId id="395" r:id="rId29"/>
+    <p:sldId id="380" r:id="rId30"/>
+    <p:sldId id="381" r:id="rId31"/>
   </p:sldIdLst>
   <p:sldSz cx="9144000" cy="6858000" type="screen4x3"/>
   <p:notesSz cx="9925050" cy="6665913"/>
@@ -2475,7 +2477,11 @@
         <a:lstStyle/>
         <a:p>
           <a:r>
-            <a:rPr lang="de-DE" sz="1400" dirty="0"/>
+            <a:rPr lang="de-DE" sz="1400" dirty="0">
+              <a:solidFill>
+                <a:srgbClr val="DAD7CB"/>
+              </a:solidFill>
+            </a:rPr>
             <a:t>Speech Synthesis</a:t>
           </a:r>
         </a:p>
@@ -2520,22 +2526,42 @@
         <a:lstStyle/>
         <a:p>
           <a:r>
-            <a:rPr lang="de-DE" sz="1400" dirty="0"/>
+            <a:rPr lang="de-DE" sz="1400" dirty="0">
+              <a:solidFill>
+                <a:srgbClr val="DAD7CB"/>
+              </a:solidFill>
+            </a:rPr>
             <a:t>Text-</a:t>
           </a:r>
           <a:r>
-            <a:rPr lang="de-DE" sz="1400" dirty="0" err="1"/>
+            <a:rPr lang="de-DE" sz="1400" dirty="0" err="1">
+              <a:solidFill>
+                <a:srgbClr val="DAD7CB"/>
+              </a:solidFill>
+            </a:rPr>
             <a:t>to</a:t>
           </a:r>
           <a:r>
-            <a:rPr lang="de-DE" sz="1400" dirty="0"/>
+            <a:rPr lang="de-DE" sz="1400" dirty="0">
+              <a:solidFill>
+                <a:srgbClr val="DAD7CB"/>
+              </a:solidFill>
+            </a:rPr>
             <a:t>-Speech</a:t>
           </a:r>
           <a:br>
-            <a:rPr lang="de-DE" sz="1400" dirty="0"/>
+            <a:rPr lang="de-DE" sz="1400" dirty="0">
+              <a:solidFill>
+                <a:srgbClr val="DAD7CB"/>
+              </a:solidFill>
+            </a:rPr>
           </a:br>
           <a:r>
-            <a:rPr lang="de-DE" sz="1400" dirty="0"/>
+            <a:rPr lang="de-DE" sz="1400" dirty="0">
+              <a:solidFill>
+                <a:srgbClr val="DAD7CB"/>
+              </a:solidFill>
+            </a:rPr>
             <a:t>(TTS)</a:t>
           </a:r>
         </a:p>
@@ -2580,17 +2606,33 @@
         <a:lstStyle/>
         <a:p>
           <a:r>
-            <a:rPr lang="de-DE" sz="1400"/>
+            <a:rPr lang="de-DE" sz="1400">
+              <a:solidFill>
+                <a:srgbClr val="DAD7CB"/>
+              </a:solidFill>
+            </a:rPr>
             <a:t>Context-to-Speech</a:t>
           </a:r>
           <a:br>
-            <a:rPr lang="de-DE" sz="1400"/>
+            <a:rPr lang="de-DE" sz="1400">
+              <a:solidFill>
+                <a:srgbClr val="DAD7CB"/>
+              </a:solidFill>
+            </a:rPr>
           </a:br>
           <a:r>
-            <a:rPr lang="de-DE" sz="1400"/>
+            <a:rPr lang="de-DE" sz="1400">
+              <a:solidFill>
+                <a:srgbClr val="DAD7CB"/>
+              </a:solidFill>
+            </a:rPr>
             <a:t>(CTS)</a:t>
           </a:r>
-          <a:endParaRPr lang="de-DE" sz="1400" dirty="0"/>
+          <a:endParaRPr lang="de-DE" sz="1400" dirty="0">
+            <a:solidFill>
+              <a:srgbClr val="DAD7CB"/>
+            </a:solidFill>
+          </a:endParaRPr>
         </a:p>
       </dgm:t>
     </dgm:pt>
@@ -2633,11 +2675,19 @@
         <a:lstStyle/>
         <a:p>
           <a:r>
-            <a:rPr lang="de-DE" sz="1400" dirty="0" err="1"/>
+            <a:rPr lang="de-DE" sz="1400" dirty="0" err="1">
+              <a:solidFill>
+                <a:srgbClr val="DAD7CB"/>
+              </a:solidFill>
+            </a:rPr>
             <a:t>Canned</a:t>
           </a:r>
           <a:r>
-            <a:rPr lang="de-DE" sz="1400" dirty="0"/>
+            <a:rPr lang="de-DE" sz="1400" dirty="0">
+              <a:solidFill>
+                <a:srgbClr val="DAD7CB"/>
+              </a:solidFill>
+            </a:rPr>
             <a:t> Speech</a:t>
           </a:r>
         </a:p>
@@ -2795,10 +2845,18 @@
             </a:lnSpc>
           </a:pPr>
           <a:r>
-            <a:rPr lang="en-US" sz="1400" dirty="0"/>
+            <a:rPr lang="en-US" sz="1400" dirty="0">
+              <a:solidFill>
+                <a:srgbClr val="DAD7CB"/>
+              </a:solidFill>
+            </a:rPr>
             <a:t>The Impact of Deep Learning on Speech Synthesis with Mobile Devices</a:t>
           </a:r>
-          <a:endParaRPr lang="de-DE" sz="1400" b="1" dirty="0"/>
+          <a:endParaRPr lang="de-DE" sz="1400" b="1" dirty="0">
+            <a:solidFill>
+              <a:srgbClr val="DAD7CB"/>
+            </a:solidFill>
+          </a:endParaRPr>
         </a:p>
       </dgm:t>
     </dgm:pt>
@@ -2809,7 +2867,11 @@
         <a:bodyPr/>
         <a:lstStyle/>
         <a:p>
-          <a:endParaRPr lang="de-DE"/>
+          <a:endParaRPr lang="de-DE">
+            <a:solidFill>
+              <a:srgbClr val="DAD7CB"/>
+            </a:solidFill>
+          </a:endParaRPr>
         </a:p>
       </dgm:t>
     </dgm:pt>
@@ -2820,7 +2882,11 @@
         <a:bodyPr/>
         <a:lstStyle/>
         <a:p>
-          <a:endParaRPr lang="de-DE"/>
+          <a:endParaRPr lang="de-DE">
+            <a:solidFill>
+              <a:srgbClr val="DAD7CB"/>
+            </a:solidFill>
+          </a:endParaRPr>
         </a:p>
       </dgm:t>
     </dgm:pt>
@@ -2841,14 +2907,26 @@
         <a:lstStyle/>
         <a:p>
           <a:r>
-            <a:rPr lang="de-DE" sz="1400" dirty="0"/>
+            <a:rPr lang="de-DE" sz="1400" dirty="0">
+              <a:solidFill>
+                <a:srgbClr val="DAD7CB"/>
+              </a:solidFill>
+            </a:rPr>
             <a:t>Low-</a:t>
           </a:r>
           <a:r>
-            <a:rPr lang="de-DE" sz="1400" dirty="0" err="1"/>
+            <a:rPr lang="de-DE" sz="1400" dirty="0" err="1">
+              <a:solidFill>
+                <a:srgbClr val="DAD7CB"/>
+              </a:solidFill>
+            </a:rPr>
             <a:t>Latency</a:t>
           </a:r>
-          <a:endParaRPr lang="de-DE" sz="1400" dirty="0"/>
+          <a:endParaRPr lang="de-DE" sz="1400" dirty="0">
+            <a:solidFill>
+              <a:srgbClr val="DAD7CB"/>
+            </a:solidFill>
+          </a:endParaRPr>
         </a:p>
       </dgm:t>
     </dgm:pt>
@@ -2859,7 +2937,11 @@
         <a:bodyPr/>
         <a:lstStyle/>
         <a:p>
-          <a:endParaRPr lang="de-DE"/>
+          <a:endParaRPr lang="de-DE">
+            <a:solidFill>
+              <a:srgbClr val="DAD7CB"/>
+            </a:solidFill>
+          </a:endParaRPr>
         </a:p>
       </dgm:t>
     </dgm:pt>
@@ -2870,7 +2952,11 @@
         <a:bodyPr/>
         <a:lstStyle/>
         <a:p>
-          <a:endParaRPr lang="de-DE"/>
+          <a:endParaRPr lang="de-DE">
+            <a:solidFill>
+              <a:srgbClr val="DAD7CB"/>
+            </a:solidFill>
+          </a:endParaRPr>
         </a:p>
       </dgm:t>
     </dgm:pt>
@@ -2891,26 +2977,50 @@
         <a:lstStyle/>
         <a:p>
           <a:r>
-            <a:rPr lang="de-DE" sz="1400" dirty="0" err="1"/>
+            <a:rPr lang="de-DE" sz="1400" dirty="0" err="1">
+              <a:solidFill>
+                <a:srgbClr val="DAD7CB"/>
+              </a:solidFill>
+            </a:rPr>
             <a:t>Increased</a:t>
           </a:r>
           <a:r>
-            <a:rPr lang="de-DE" sz="1400" dirty="0"/>
+            <a:rPr lang="de-DE" sz="1400" dirty="0">
+              <a:solidFill>
+                <a:srgbClr val="DAD7CB"/>
+              </a:solidFill>
+            </a:rPr>
             <a:t> </a:t>
           </a:r>
           <a:r>
-            <a:rPr lang="de-DE" sz="1400" dirty="0" err="1"/>
+            <a:rPr lang="de-DE" sz="1400" dirty="0" err="1">
+              <a:solidFill>
+                <a:srgbClr val="DAD7CB"/>
+              </a:solidFill>
+            </a:rPr>
             <a:t>prediction</a:t>
           </a:r>
           <a:r>
-            <a:rPr lang="de-DE" sz="1400" dirty="0"/>
+            <a:rPr lang="de-DE" sz="1400" dirty="0">
+              <a:solidFill>
+                <a:srgbClr val="DAD7CB"/>
+              </a:solidFill>
+            </a:rPr>
             <a:t> </a:t>
           </a:r>
           <a:r>
-            <a:rPr lang="de-DE" sz="1400" dirty="0" err="1"/>
+            <a:rPr lang="de-DE" sz="1400" dirty="0" err="1">
+              <a:solidFill>
+                <a:srgbClr val="DAD7CB"/>
+              </a:solidFill>
+            </a:rPr>
             <a:t>performance</a:t>
           </a:r>
-          <a:endParaRPr lang="de-DE" sz="1400" dirty="0"/>
+          <a:endParaRPr lang="de-DE" sz="1400" dirty="0">
+            <a:solidFill>
+              <a:srgbClr val="DAD7CB"/>
+            </a:solidFill>
+          </a:endParaRPr>
         </a:p>
       </dgm:t>
     </dgm:pt>
@@ -2921,7 +3031,11 @@
         <a:bodyPr/>
         <a:lstStyle/>
         <a:p>
-          <a:endParaRPr lang="de-DE"/>
+          <a:endParaRPr lang="de-DE">
+            <a:solidFill>
+              <a:srgbClr val="DAD7CB"/>
+            </a:solidFill>
+          </a:endParaRPr>
         </a:p>
       </dgm:t>
     </dgm:pt>
@@ -2932,7 +3046,11 @@
         <a:bodyPr/>
         <a:lstStyle/>
         <a:p>
-          <a:endParaRPr lang="de-DE"/>
+          <a:endParaRPr lang="de-DE">
+            <a:solidFill>
+              <a:srgbClr val="DAD7CB"/>
+            </a:solidFill>
+          </a:endParaRPr>
         </a:p>
       </dgm:t>
     </dgm:pt>
@@ -2953,26 +3071,50 @@
         <a:lstStyle/>
         <a:p>
           <a:r>
-            <a:rPr lang="de-DE" sz="1400" dirty="0" err="1"/>
+            <a:rPr lang="de-DE" sz="1400" dirty="0" err="1">
+              <a:solidFill>
+                <a:srgbClr val="DAD7CB"/>
+              </a:solidFill>
+            </a:rPr>
             <a:t>Smaller</a:t>
           </a:r>
           <a:r>
-            <a:rPr lang="de-DE" sz="1400" dirty="0"/>
+            <a:rPr lang="de-DE" sz="1400" dirty="0">
+              <a:solidFill>
+                <a:srgbClr val="DAD7CB"/>
+              </a:solidFill>
+            </a:rPr>
             <a:t> </a:t>
           </a:r>
           <a:r>
-            <a:rPr lang="de-DE" sz="1400" dirty="0" err="1"/>
+            <a:rPr lang="de-DE" sz="1400" dirty="0" err="1">
+              <a:solidFill>
+                <a:srgbClr val="DAD7CB"/>
+              </a:solidFill>
+            </a:rPr>
             <a:t>memory</a:t>
           </a:r>
           <a:r>
-            <a:rPr lang="de-DE" sz="1400" dirty="0"/>
+            <a:rPr lang="de-DE" sz="1400" dirty="0">
+              <a:solidFill>
+                <a:srgbClr val="DAD7CB"/>
+              </a:solidFill>
+            </a:rPr>
             <a:t> </a:t>
           </a:r>
           <a:r>
-            <a:rPr lang="de-DE" sz="1400" dirty="0" err="1"/>
+            <a:rPr lang="de-DE" sz="1400" dirty="0" err="1">
+              <a:solidFill>
+                <a:srgbClr val="DAD7CB"/>
+              </a:solidFill>
+            </a:rPr>
             <a:t>footprint</a:t>
           </a:r>
-          <a:endParaRPr lang="de-DE" sz="1400" dirty="0"/>
+          <a:endParaRPr lang="de-DE" sz="1400" dirty="0">
+            <a:solidFill>
+              <a:srgbClr val="DAD7CB"/>
+            </a:solidFill>
+          </a:endParaRPr>
         </a:p>
       </dgm:t>
     </dgm:pt>
@@ -2983,7 +3125,11 @@
         <a:bodyPr/>
         <a:lstStyle/>
         <a:p>
-          <a:endParaRPr lang="de-DE"/>
+          <a:endParaRPr lang="de-DE">
+            <a:solidFill>
+              <a:srgbClr val="DAD7CB"/>
+            </a:solidFill>
+          </a:endParaRPr>
         </a:p>
       </dgm:t>
     </dgm:pt>
@@ -2994,7 +3140,11 @@
         <a:bodyPr/>
         <a:lstStyle/>
         <a:p>
-          <a:endParaRPr lang="de-DE"/>
+          <a:endParaRPr lang="de-DE">
+            <a:solidFill>
+              <a:srgbClr val="DAD7CB"/>
+            </a:solidFill>
+          </a:endParaRPr>
         </a:p>
       </dgm:t>
     </dgm:pt>
@@ -3157,7 +3307,11 @@
             <a:buNone/>
           </a:pPr>
           <a:r>
-            <a:rPr lang="de-DE" sz="1400" kern="1200" dirty="0"/>
+            <a:rPr lang="de-DE" sz="1400" kern="1200" dirty="0">
+              <a:solidFill>
+                <a:srgbClr val="DAD7CB"/>
+              </a:solidFill>
+            </a:rPr>
             <a:t>Speech Synthesis</a:t>
           </a:r>
         </a:p>
@@ -3279,11 +3433,19 @@
             <a:buNone/>
           </a:pPr>
           <a:r>
-            <a:rPr lang="de-DE" sz="1400" kern="1200" dirty="0" err="1"/>
+            <a:rPr lang="de-DE" sz="1400" kern="1200" dirty="0" err="1">
+              <a:solidFill>
+                <a:srgbClr val="DAD7CB"/>
+              </a:solidFill>
+            </a:rPr>
             <a:t>Canned</a:t>
           </a:r>
           <a:r>
-            <a:rPr lang="de-DE" sz="1400" kern="1200" dirty="0"/>
+            <a:rPr lang="de-DE" sz="1400" kern="1200" dirty="0">
+              <a:solidFill>
+                <a:srgbClr val="DAD7CB"/>
+              </a:solidFill>
+            </a:rPr>
             <a:t> Speech</a:t>
           </a:r>
         </a:p>
@@ -3405,17 +3567,33 @@
             <a:buNone/>
           </a:pPr>
           <a:r>
-            <a:rPr lang="de-DE" sz="1400" kern="1200"/>
+            <a:rPr lang="de-DE" sz="1400" kern="1200">
+              <a:solidFill>
+                <a:srgbClr val="DAD7CB"/>
+              </a:solidFill>
+            </a:rPr>
             <a:t>Context-to-Speech</a:t>
           </a:r>
           <a:br>
-            <a:rPr lang="de-DE" sz="1400" kern="1200"/>
+            <a:rPr lang="de-DE" sz="1400" kern="1200">
+              <a:solidFill>
+                <a:srgbClr val="DAD7CB"/>
+              </a:solidFill>
+            </a:rPr>
           </a:br>
           <a:r>
-            <a:rPr lang="de-DE" sz="1400" kern="1200"/>
+            <a:rPr lang="de-DE" sz="1400" kern="1200">
+              <a:solidFill>
+                <a:srgbClr val="DAD7CB"/>
+              </a:solidFill>
+            </a:rPr>
             <a:t>(CTS)</a:t>
           </a:r>
-          <a:endParaRPr lang="de-DE" sz="1400" kern="1200" dirty="0"/>
+          <a:endParaRPr lang="de-DE" sz="1400" kern="1200" dirty="0">
+            <a:solidFill>
+              <a:srgbClr val="DAD7CB"/>
+            </a:solidFill>
+          </a:endParaRPr>
         </a:p>
       </dsp:txBody>
       <dsp:txXfrm>
@@ -3535,22 +3713,42 @@
             <a:buNone/>
           </a:pPr>
           <a:r>
-            <a:rPr lang="de-DE" sz="1400" kern="1200" dirty="0"/>
+            <a:rPr lang="de-DE" sz="1400" kern="1200" dirty="0">
+              <a:solidFill>
+                <a:srgbClr val="DAD7CB"/>
+              </a:solidFill>
+            </a:rPr>
             <a:t>Text-</a:t>
           </a:r>
           <a:r>
-            <a:rPr lang="de-DE" sz="1400" kern="1200" dirty="0" err="1"/>
+            <a:rPr lang="de-DE" sz="1400" kern="1200" dirty="0" err="1">
+              <a:solidFill>
+                <a:srgbClr val="DAD7CB"/>
+              </a:solidFill>
+            </a:rPr>
             <a:t>to</a:t>
           </a:r>
           <a:r>
-            <a:rPr lang="de-DE" sz="1400" kern="1200" dirty="0"/>
+            <a:rPr lang="de-DE" sz="1400" kern="1200" dirty="0">
+              <a:solidFill>
+                <a:srgbClr val="DAD7CB"/>
+              </a:solidFill>
+            </a:rPr>
             <a:t>-Speech</a:t>
           </a:r>
           <a:br>
-            <a:rPr lang="de-DE" sz="1400" kern="1200" dirty="0"/>
+            <a:rPr lang="de-DE" sz="1400" kern="1200" dirty="0">
+              <a:solidFill>
+                <a:srgbClr val="DAD7CB"/>
+              </a:solidFill>
+            </a:rPr>
           </a:br>
           <a:r>
-            <a:rPr lang="de-DE" sz="1400" kern="1200" dirty="0"/>
+            <a:rPr lang="de-DE" sz="1400" kern="1200" dirty="0">
+              <a:solidFill>
+                <a:srgbClr val="DAD7CB"/>
+              </a:solidFill>
+            </a:rPr>
             <a:t>(TTS)</a:t>
           </a:r>
         </a:p>
@@ -3629,10 +3827,18 @@
             <a:buNone/>
           </a:pPr>
           <a:r>
-            <a:rPr lang="en-US" sz="1400" kern="1200" dirty="0"/>
+            <a:rPr lang="en-US" sz="1400" kern="1200" dirty="0">
+              <a:solidFill>
+                <a:srgbClr val="DAD7CB"/>
+              </a:solidFill>
+            </a:rPr>
             <a:t>The Impact of Deep Learning on Speech Synthesis with Mobile Devices</a:t>
           </a:r>
-          <a:endParaRPr lang="de-DE" sz="1400" b="1" kern="1200" dirty="0"/>
+          <a:endParaRPr lang="de-DE" sz="1400" b="1" kern="1200" dirty="0">
+            <a:solidFill>
+              <a:srgbClr val="DAD7CB"/>
+            </a:solidFill>
+          </a:endParaRPr>
         </a:p>
       </dsp:txBody>
       <dsp:txXfrm>
@@ -3752,26 +3958,50 @@
             <a:buNone/>
           </a:pPr>
           <a:r>
-            <a:rPr lang="de-DE" sz="1400" kern="1200" dirty="0" err="1"/>
+            <a:rPr lang="de-DE" sz="1400" kern="1200" dirty="0" err="1">
+              <a:solidFill>
+                <a:srgbClr val="DAD7CB"/>
+              </a:solidFill>
+            </a:rPr>
             <a:t>Smaller</a:t>
           </a:r>
           <a:r>
-            <a:rPr lang="de-DE" sz="1400" kern="1200" dirty="0"/>
+            <a:rPr lang="de-DE" sz="1400" kern="1200" dirty="0">
+              <a:solidFill>
+                <a:srgbClr val="DAD7CB"/>
+              </a:solidFill>
+            </a:rPr>
             <a:t> </a:t>
           </a:r>
           <a:r>
-            <a:rPr lang="de-DE" sz="1400" kern="1200" dirty="0" err="1"/>
+            <a:rPr lang="de-DE" sz="1400" kern="1200" dirty="0" err="1">
+              <a:solidFill>
+                <a:srgbClr val="DAD7CB"/>
+              </a:solidFill>
+            </a:rPr>
             <a:t>memory</a:t>
           </a:r>
           <a:r>
-            <a:rPr lang="de-DE" sz="1400" kern="1200" dirty="0"/>
+            <a:rPr lang="de-DE" sz="1400" kern="1200" dirty="0">
+              <a:solidFill>
+                <a:srgbClr val="DAD7CB"/>
+              </a:solidFill>
+            </a:rPr>
             <a:t> </a:t>
           </a:r>
           <a:r>
-            <a:rPr lang="de-DE" sz="1400" kern="1200" dirty="0" err="1"/>
+            <a:rPr lang="de-DE" sz="1400" kern="1200" dirty="0" err="1">
+              <a:solidFill>
+                <a:srgbClr val="DAD7CB"/>
+              </a:solidFill>
+            </a:rPr>
             <a:t>footprint</a:t>
           </a:r>
-          <a:endParaRPr lang="de-DE" sz="1400" kern="1200" dirty="0"/>
+          <a:endParaRPr lang="de-DE" sz="1400" kern="1200" dirty="0">
+            <a:solidFill>
+              <a:srgbClr val="DAD7CB"/>
+            </a:solidFill>
+          </a:endParaRPr>
         </a:p>
       </dsp:txBody>
       <dsp:txXfrm>
@@ -3891,26 +4121,50 @@
             <a:buNone/>
           </a:pPr>
           <a:r>
-            <a:rPr lang="de-DE" sz="1400" kern="1200" dirty="0" err="1"/>
+            <a:rPr lang="de-DE" sz="1400" kern="1200" dirty="0" err="1">
+              <a:solidFill>
+                <a:srgbClr val="DAD7CB"/>
+              </a:solidFill>
+            </a:rPr>
             <a:t>Increased</a:t>
           </a:r>
           <a:r>
-            <a:rPr lang="de-DE" sz="1400" kern="1200" dirty="0"/>
+            <a:rPr lang="de-DE" sz="1400" kern="1200" dirty="0">
+              <a:solidFill>
+                <a:srgbClr val="DAD7CB"/>
+              </a:solidFill>
+            </a:rPr>
             <a:t> </a:t>
           </a:r>
           <a:r>
-            <a:rPr lang="de-DE" sz="1400" kern="1200" dirty="0" err="1"/>
+            <a:rPr lang="de-DE" sz="1400" kern="1200" dirty="0" err="1">
+              <a:solidFill>
+                <a:srgbClr val="DAD7CB"/>
+              </a:solidFill>
+            </a:rPr>
             <a:t>prediction</a:t>
           </a:r>
           <a:r>
-            <a:rPr lang="de-DE" sz="1400" kern="1200" dirty="0"/>
+            <a:rPr lang="de-DE" sz="1400" kern="1200" dirty="0">
+              <a:solidFill>
+                <a:srgbClr val="DAD7CB"/>
+              </a:solidFill>
+            </a:rPr>
             <a:t> </a:t>
           </a:r>
           <a:r>
-            <a:rPr lang="de-DE" sz="1400" kern="1200" dirty="0" err="1"/>
+            <a:rPr lang="de-DE" sz="1400" kern="1200" dirty="0" err="1">
+              <a:solidFill>
+                <a:srgbClr val="DAD7CB"/>
+              </a:solidFill>
+            </a:rPr>
             <a:t>performance</a:t>
           </a:r>
-          <a:endParaRPr lang="de-DE" sz="1400" kern="1200" dirty="0"/>
+          <a:endParaRPr lang="de-DE" sz="1400" kern="1200" dirty="0">
+            <a:solidFill>
+              <a:srgbClr val="DAD7CB"/>
+            </a:solidFill>
+          </a:endParaRPr>
         </a:p>
       </dsp:txBody>
       <dsp:txXfrm>
@@ -4030,14 +4284,26 @@
             <a:buNone/>
           </a:pPr>
           <a:r>
-            <a:rPr lang="de-DE" sz="1400" kern="1200" dirty="0"/>
+            <a:rPr lang="de-DE" sz="1400" kern="1200" dirty="0">
+              <a:solidFill>
+                <a:srgbClr val="DAD7CB"/>
+              </a:solidFill>
+            </a:rPr>
             <a:t>Low-</a:t>
           </a:r>
           <a:r>
-            <a:rPr lang="de-DE" sz="1400" kern="1200" dirty="0" err="1"/>
+            <a:rPr lang="de-DE" sz="1400" kern="1200" dirty="0" err="1">
+              <a:solidFill>
+                <a:srgbClr val="DAD7CB"/>
+              </a:solidFill>
+            </a:rPr>
             <a:t>Latency</a:t>
           </a:r>
-          <a:endParaRPr lang="de-DE" sz="1400" kern="1200" dirty="0"/>
+          <a:endParaRPr lang="de-DE" sz="1400" kern="1200" dirty="0">
+            <a:solidFill>
+              <a:srgbClr val="DAD7CB"/>
+            </a:solidFill>
+          </a:endParaRPr>
         </a:p>
       </dsp:txBody>
       <dsp:txXfrm>
@@ -21192,10 +21458,10 @@
       </p:sp>
       <p:grpSp>
         <p:nvGrpSpPr>
-          <p:cNvPr id="11" name="Gruppieren 10">
+          <p:cNvPr id="20" name="Gruppieren 19">
             <a:extLst>
               <a:ext uri="{FF2B5EF4-FFF2-40B4-BE49-F238E27FC236}">
-                <a16:creationId xmlns:a16="http://schemas.microsoft.com/office/drawing/2014/main" id="{80340793-FA47-4D52-990C-8EC0D8127117}"/>
+                <a16:creationId xmlns:a16="http://schemas.microsoft.com/office/drawing/2014/main" id="{12F6CB33-A78F-4EBB-995A-3DFC4ED3B744}"/>
               </a:ext>
             </a:extLst>
           </p:cNvPr>
@@ -21204,48 +21470,18 @@
         </p:nvGrpSpPr>
         <p:grpSpPr>
           <a:xfrm>
-            <a:off x="5271465" y="1978720"/>
-            <a:ext cx="3262935" cy="3261276"/>
-            <a:chOff x="2382215" y="2133600"/>
-            <a:chExt cx="3790321" cy="3661037"/>
+            <a:off x="5378048" y="2595940"/>
+            <a:ext cx="3352800" cy="3121221"/>
+            <a:chOff x="3086100" y="2860829"/>
+            <a:chExt cx="3352800" cy="3121221"/>
           </a:xfrm>
         </p:grpSpPr>
-        <p:pic>
-          <p:nvPicPr>
-            <p:cNvPr id="9" name="Grafik 8">
+        <p:sp>
+          <p:nvSpPr>
+            <p:cNvPr id="17" name="Textfeld 16">
               <a:extLst>
                 <a:ext uri="{FF2B5EF4-FFF2-40B4-BE49-F238E27FC236}">
-                  <a16:creationId xmlns:a16="http://schemas.microsoft.com/office/drawing/2014/main" id="{157B58F4-C6C9-44B9-B9C9-F01B9DA1AC2E}"/>
-                </a:ext>
-              </a:extLst>
-            </p:cNvPr>
-            <p:cNvPicPr>
-              <a:picLocks noChangeAspect="1"/>
-            </p:cNvPicPr>
-            <p:nvPr/>
-          </p:nvPicPr>
-          <p:blipFill>
-            <a:blip r:embed="rId2"/>
-            <a:stretch>
-              <a:fillRect/>
-            </a:stretch>
-          </p:blipFill>
-          <p:spPr>
-            <a:xfrm>
-              <a:off x="2382215" y="2133600"/>
-              <a:ext cx="3790321" cy="3295650"/>
-            </a:xfrm>
-            <a:prstGeom prst="rect">
-              <a:avLst/>
-            </a:prstGeom>
-          </p:spPr>
-        </p:pic>
-        <p:sp>
-          <p:nvSpPr>
-            <p:cNvPr id="10" name="Textfeld 9">
-              <a:extLst>
-                <a:ext uri="{FF2B5EF4-FFF2-40B4-BE49-F238E27FC236}">
-                  <a16:creationId xmlns:a16="http://schemas.microsoft.com/office/drawing/2014/main" id="{0C1EDCCA-84E4-4DDF-99B6-46055841ED30}"/>
+                  <a16:creationId xmlns:a16="http://schemas.microsoft.com/office/drawing/2014/main" id="{66F7D42F-34E3-4D63-B626-AD4262177D59}"/>
                 </a:ext>
               </a:extLst>
             </p:cNvPr>
@@ -21254,8 +21490,8 @@
           </p:nvSpPr>
           <p:spPr>
             <a:xfrm>
-              <a:off x="2382215" y="5584130"/>
-              <a:ext cx="726161" cy="210507"/>
+              <a:off x="3086100" y="5794529"/>
+              <a:ext cx="625123" cy="187521"/>
             </a:xfrm>
             <a:prstGeom prst="rect">
               <a:avLst/>
@@ -21285,6 +21521,211 @@
             </a:p>
           </p:txBody>
         </p:sp>
+        <p:pic>
+          <p:nvPicPr>
+            <p:cNvPr id="19" name="Grafik 18">
+              <a:extLst>
+                <a:ext uri="{FF2B5EF4-FFF2-40B4-BE49-F238E27FC236}">
+                  <a16:creationId xmlns:a16="http://schemas.microsoft.com/office/drawing/2014/main" id="{8D876E68-1789-4A41-9EFF-04FDE01BCA7F}"/>
+                </a:ext>
+              </a:extLst>
+            </p:cNvPr>
+            <p:cNvPicPr>
+              <a:picLocks noChangeAspect="1"/>
+            </p:cNvPicPr>
+            <p:nvPr/>
+          </p:nvPicPr>
+          <p:blipFill>
+            <a:blip r:embed="rId2"/>
+            <a:stretch>
+              <a:fillRect/>
+            </a:stretch>
+          </p:blipFill>
+          <p:spPr>
+            <a:xfrm>
+              <a:off x="3086100" y="2860829"/>
+              <a:ext cx="3352800" cy="2933700"/>
+            </a:xfrm>
+            <a:prstGeom prst="rect">
+              <a:avLst/>
+            </a:prstGeom>
+          </p:spPr>
+        </p:pic>
+      </p:grpSp>
+      <p:grpSp>
+        <p:nvGrpSpPr>
+          <p:cNvPr id="25" name="Gruppieren 24">
+            <a:extLst>
+              <a:ext uri="{FF2B5EF4-FFF2-40B4-BE49-F238E27FC236}">
+                <a16:creationId xmlns:a16="http://schemas.microsoft.com/office/drawing/2014/main" id="{123F9B61-F842-40FA-8991-036F2E877F9C}"/>
+              </a:ext>
+            </a:extLst>
+          </p:cNvPr>
+          <p:cNvGrpSpPr/>
+          <p:nvPr/>
+        </p:nvGrpSpPr>
+        <p:grpSpPr>
+          <a:xfrm>
+            <a:off x="5104436" y="2076925"/>
+            <a:ext cx="3722498" cy="2929415"/>
+            <a:chOff x="5104436" y="2076925"/>
+            <a:chExt cx="3722498" cy="2929415"/>
+          </a:xfrm>
+        </p:grpSpPr>
+        <p:sp>
+          <p:nvSpPr>
+            <p:cNvPr id="21" name="L-Form 20">
+              <a:extLst>
+                <a:ext uri="{FF2B5EF4-FFF2-40B4-BE49-F238E27FC236}">
+                  <a16:creationId xmlns:a16="http://schemas.microsoft.com/office/drawing/2014/main" id="{0DF4A44E-A973-445C-A80A-AA8583FAC018}"/>
+                </a:ext>
+              </a:extLst>
+            </p:cNvPr>
+            <p:cNvSpPr/>
+            <p:nvPr/>
+          </p:nvSpPr>
+          <p:spPr>
+            <a:xfrm>
+              <a:off x="5311140" y="2527200"/>
+              <a:ext cx="3515794" cy="2479140"/>
+            </a:xfrm>
+            <a:prstGeom prst="corner">
+              <a:avLst>
+                <a:gd name="adj1" fmla="val 76558"/>
+                <a:gd name="adj2" fmla="val 54241"/>
+              </a:avLst>
+            </a:prstGeom>
+            <a:noFill/>
+            <a:ln w="38100">
+              <a:solidFill>
+                <a:srgbClr val="E37222"/>
+              </a:solidFill>
+              <a:prstDash val="sysDash"/>
+            </a:ln>
+          </p:spPr>
+          <p:style>
+            <a:lnRef idx="2">
+              <a:schemeClr val="accent1">
+                <a:shade val="50000"/>
+              </a:schemeClr>
+            </a:lnRef>
+            <a:fillRef idx="1">
+              <a:schemeClr val="accent1"/>
+            </a:fillRef>
+            <a:effectRef idx="0">
+              <a:schemeClr val="accent1"/>
+            </a:effectRef>
+            <a:fontRef idx="minor">
+              <a:schemeClr val="lt1"/>
+            </a:fontRef>
+          </p:style>
+          <p:txBody>
+            <a:bodyPr rot="0" spcFirstLastPara="0" vertOverflow="overflow" horzOverflow="overflow" vert="horz" wrap="square" lIns="91440" tIns="45720" rIns="91440" bIns="45720" numCol="1" spcCol="0" rtlCol="0" fromWordArt="0" anchor="t" anchorCtr="0" forceAA="0" compatLnSpc="1">
+              <a:prstTxWarp prst="textNoShape">
+                <a:avLst/>
+              </a:prstTxWarp>
+              <a:noAutofit/>
+            </a:bodyPr>
+            <a:lstStyle/>
+            <a:p>
+              <a:pPr algn="ctr">
+                <a:lnSpc>
+                  <a:spcPct val="114000"/>
+                </a:lnSpc>
+              </a:pPr>
+              <a:endParaRPr lang="en-US" dirty="0"/>
+            </a:p>
+          </p:txBody>
+        </p:sp>
+        <p:sp>
+          <p:nvSpPr>
+            <p:cNvPr id="23" name="Rechteck 22">
+              <a:extLst>
+                <a:ext uri="{FF2B5EF4-FFF2-40B4-BE49-F238E27FC236}">
+                  <a16:creationId xmlns:a16="http://schemas.microsoft.com/office/drawing/2014/main" id="{ACC832E9-C6D2-46BE-9D9C-7D631DF7413A}"/>
+                </a:ext>
+              </a:extLst>
+            </p:cNvPr>
+            <p:cNvSpPr/>
+            <p:nvPr/>
+          </p:nvSpPr>
+          <p:spPr>
+            <a:xfrm>
+              <a:off x="5104436" y="2076925"/>
+              <a:ext cx="2079415" cy="400110"/>
+            </a:xfrm>
+            <a:prstGeom prst="rect">
+              <a:avLst/>
+            </a:prstGeom>
+            <a:noFill/>
+          </p:spPr>
+          <p:txBody>
+            <a:bodyPr wrap="none" lIns="91440" tIns="45720" rIns="91440" bIns="45720">
+              <a:spAutoFit/>
+            </a:bodyPr>
+            <a:lstStyle/>
+            <a:p>
+              <a:pPr algn="ctr"/>
+              <a:r>
+                <a:rPr lang="de-DE" sz="2000" b="1" cap="none" spc="0" dirty="0" err="1">
+                  <a:ln w="0">
+                    <a:solidFill>
+                      <a:srgbClr val="DAD7CB"/>
+                    </a:solidFill>
+                  </a:ln>
+                  <a:solidFill>
+                    <a:srgbClr val="E37222"/>
+                  </a:solidFill>
+                  <a:effectLst>
+                    <a:outerShdw blurRad="38100" dist="25400" dir="5400000" algn="ctr" rotWithShape="0">
+                      <a:srgbClr val="6E747A">
+                        <a:alpha val="43000"/>
+                      </a:srgbClr>
+                    </a:outerShdw>
+                  </a:effectLst>
+                </a:rPr>
+                <a:t>Acoustic</a:t>
+              </a:r>
+              <a:r>
+                <a:rPr lang="de-DE" sz="2000" b="1" cap="none" spc="0" dirty="0">
+                  <a:ln w="0">
+                    <a:solidFill>
+                      <a:srgbClr val="DAD7CB"/>
+                    </a:solidFill>
+                  </a:ln>
+                  <a:solidFill>
+                    <a:srgbClr val="E37222"/>
+                  </a:solidFill>
+                  <a:effectLst>
+                    <a:outerShdw blurRad="38100" dist="25400" dir="5400000" algn="ctr" rotWithShape="0">
+                      <a:srgbClr val="6E747A">
+                        <a:alpha val="43000"/>
+                      </a:srgbClr>
+                    </a:outerShdw>
+                  </a:effectLst>
+                </a:rPr>
+                <a:t> Model</a:t>
+              </a:r>
+              <a:endParaRPr lang="de-DE" sz="4000" b="1" cap="none" spc="0" dirty="0">
+                <a:ln w="0">
+                  <a:solidFill>
+                    <a:srgbClr val="DAD7CB"/>
+                  </a:solidFill>
+                </a:ln>
+                <a:solidFill>
+                  <a:srgbClr val="E37222"/>
+                </a:solidFill>
+                <a:effectLst>
+                  <a:outerShdw blurRad="38100" dist="25400" dir="5400000" algn="ctr" rotWithShape="0">
+                    <a:srgbClr val="6E747A">
+                      <a:alpha val="43000"/>
+                    </a:srgbClr>
+                  </a:outerShdw>
+                </a:effectLst>
+              </a:endParaRPr>
+            </a:p>
+          </p:txBody>
+        </p:sp>
       </p:grpSp>
     </p:spTree>
     <p:extLst>
@@ -21296,6 +21737,81 @@
   <p:clrMapOvr>
     <a:masterClrMapping/>
   </p:clrMapOvr>
+  <p:timing>
+    <p:tnLst>
+      <p:par>
+        <p:cTn id="1" dur="indefinite" restart="never" nodeType="tmRoot">
+          <p:childTnLst>
+            <p:seq concurrent="1" nextAc="seek">
+              <p:cTn id="2" dur="indefinite" nodeType="mainSeq">
+                <p:childTnLst>
+                  <p:par>
+                    <p:cTn id="3" fill="hold">
+                      <p:stCondLst>
+                        <p:cond delay="indefinite"/>
+                      </p:stCondLst>
+                      <p:childTnLst>
+                        <p:par>
+                          <p:cTn id="4" fill="hold">
+                            <p:stCondLst>
+                              <p:cond delay="0"/>
+                            </p:stCondLst>
+                            <p:childTnLst>
+                              <p:par>
+                                <p:cTn id="5" presetID="1" presetClass="entr" presetSubtype="0" fill="hold" nodeType="clickEffect">
+                                  <p:stCondLst>
+                                    <p:cond delay="0"/>
+                                  </p:stCondLst>
+                                  <p:childTnLst>
+                                    <p:set>
+                                      <p:cBhvr>
+                                        <p:cTn id="6" dur="1" fill="hold">
+                                          <p:stCondLst>
+                                            <p:cond delay="0"/>
+                                          </p:stCondLst>
+                                        </p:cTn>
+                                        <p:tgtEl>
+                                          <p:spTgt spid="25"/>
+                                        </p:tgtEl>
+                                        <p:attrNameLst>
+                                          <p:attrName>style.visibility</p:attrName>
+                                        </p:attrNameLst>
+                                      </p:cBhvr>
+                                      <p:to>
+                                        <p:strVal val="visible"/>
+                                      </p:to>
+                                    </p:set>
+                                  </p:childTnLst>
+                                </p:cTn>
+                              </p:par>
+                            </p:childTnLst>
+                          </p:cTn>
+                        </p:par>
+                      </p:childTnLst>
+                    </p:cTn>
+                  </p:par>
+                </p:childTnLst>
+              </p:cTn>
+              <p:prevCondLst>
+                <p:cond evt="onPrev" delay="0">
+                  <p:tgtEl>
+                    <p:sldTgt/>
+                  </p:tgtEl>
+                </p:cond>
+              </p:prevCondLst>
+              <p:nextCondLst>
+                <p:cond evt="onNext" delay="0">
+                  <p:tgtEl>
+                    <p:sldTgt/>
+                  </p:tgtEl>
+                </p:cond>
+              </p:nextCondLst>
+            </p:seq>
+          </p:childTnLst>
+        </p:cTn>
+      </p:par>
+    </p:tnLst>
+  </p:timing>
 </p:sld>
 </file>
 
@@ -21445,6 +21961,36 @@
           </a:p>
         </p:txBody>
       </p:sp>
+      <p:pic>
+        <p:nvPicPr>
+          <p:cNvPr id="2" name="Grafik 1">
+            <a:extLst>
+              <a:ext uri="{FF2B5EF4-FFF2-40B4-BE49-F238E27FC236}">
+                <a16:creationId xmlns:a16="http://schemas.microsoft.com/office/drawing/2014/main" id="{D9D3E268-3BB4-4E7D-9B82-E0F6C5D0A73E}"/>
+              </a:ext>
+            </a:extLst>
+          </p:cNvPr>
+          <p:cNvPicPr>
+            <a:picLocks noChangeAspect="1"/>
+          </p:cNvPicPr>
+          <p:nvPr/>
+        </p:nvPicPr>
+        <p:blipFill>
+          <a:blip r:embed="rId2"/>
+          <a:stretch>
+            <a:fillRect/>
+          </a:stretch>
+        </p:blipFill>
+        <p:spPr>
+          <a:xfrm>
+            <a:off x="2263140" y="3275904"/>
+            <a:ext cx="4419600" cy="1736272"/>
+          </a:xfrm>
+          <a:prstGeom prst="rect">
+            <a:avLst/>
+          </a:prstGeom>
+        </p:spPr>
+      </p:pic>
     </p:spTree>
     <p:extLst>
       <p:ext uri="{BB962C8B-B14F-4D97-AF65-F5344CB8AC3E}">
@@ -22050,15 +22596,16 @@
             <p:ph idx="10"/>
           </p:nvPr>
         </p:nvSpPr>
-        <p:spPr/>
+        <p:spPr>
+          <a:xfrm>
+            <a:off x="319088" y="1978720"/>
+            <a:ext cx="8508999" cy="3347660"/>
+          </a:xfrm>
+        </p:spPr>
         <p:txBody>
           <a:bodyPr/>
           <a:lstStyle/>
           <a:p>
-            <a:pPr marL="285750" indent="-285750">
-              <a:buFont typeface="Arial" panose="020B0604020202020204" pitchFamily="34" charset="0"/>
-              <a:buChar char="•"/>
-            </a:pPr>
             <a:r>
               <a:rPr lang="en-US" dirty="0"/>
               <a:t>Motivation and Challenges</a:t>
@@ -22071,8 +22618,86 @@
             </a:pPr>
             <a:r>
               <a:rPr lang="en-US" dirty="0"/>
-              <a:t>Approach with DL -&gt; Only front-end</a:t>
-            </a:r>
+              <a:t>2.1 billion smartphone users worldwide in 2016</a:t>
+            </a:r>
+          </a:p>
+          <a:p>
+            <a:pPr marL="285750" indent="-285750">
+              <a:buFont typeface="Arial" panose="020B0604020202020204" pitchFamily="34" charset="0"/>
+              <a:buChar char="•"/>
+            </a:pPr>
+            <a:r>
+              <a:rPr lang="en-US" dirty="0"/>
+              <a:t>in 2016 about 1.5 billion new smartphones were sold</a:t>
+            </a:r>
+          </a:p>
+          <a:p>
+            <a:pPr marL="285750" indent="-285750">
+              <a:buFont typeface="Arial" panose="020B0604020202020204" pitchFamily="34" charset="0"/>
+              <a:buChar char="•"/>
+            </a:pPr>
+            <a:endParaRPr lang="de-DE" dirty="0"/>
+          </a:p>
+          <a:p>
+            <a:pPr marL="285750" indent="-285750">
+              <a:buFont typeface="Arial" panose="020B0604020202020204" pitchFamily="34" charset="0"/>
+              <a:buChar char="•"/>
+            </a:pPr>
+            <a:r>
+              <a:rPr lang="de-DE" dirty="0"/>
+              <a:t>P</a:t>
+            </a:r>
+            <a:r>
+              <a:rPr lang="en-US" dirty="0" err="1"/>
+              <a:t>ower</a:t>
+            </a:r>
+            <a:r>
+              <a:rPr lang="en-US" dirty="0"/>
+              <a:t> consumption</a:t>
+            </a:r>
+          </a:p>
+          <a:p>
+            <a:pPr marL="285750" indent="-285750">
+              <a:buFont typeface="Arial" panose="020B0604020202020204" pitchFamily="34" charset="0"/>
+              <a:buChar char="•"/>
+            </a:pPr>
+            <a:r>
+              <a:rPr lang="de-DE" dirty="0"/>
+              <a:t>M</a:t>
+            </a:r>
+            <a:r>
+              <a:rPr lang="en-US" dirty="0" err="1"/>
+              <a:t>emory</a:t>
+            </a:r>
+            <a:r>
+              <a:rPr lang="en-US" dirty="0"/>
+              <a:t> constraints</a:t>
+            </a:r>
+          </a:p>
+          <a:p>
+            <a:pPr marL="285750" indent="-285750">
+              <a:buFont typeface="Arial" panose="020B0604020202020204" pitchFamily="34" charset="0"/>
+              <a:buChar char="•"/>
+            </a:pPr>
+            <a:r>
+              <a:rPr lang="de-DE" dirty="0"/>
+              <a:t>R</a:t>
+            </a:r>
+            <a:r>
+              <a:rPr lang="en-US" dirty="0" err="1"/>
+              <a:t>eal</a:t>
+            </a:r>
+            <a:r>
+              <a:rPr lang="en-US" dirty="0"/>
+              <a:t>-time responsiveness</a:t>
+            </a:r>
+          </a:p>
+          <a:p>
+            <a:pPr marL="285750" indent="-285750">
+              <a:buFont typeface="Arial" panose="020B0604020202020204" pitchFamily="34" charset="0"/>
+              <a:buChar char="•"/>
+            </a:pPr>
+            <a:endParaRPr lang="en-US" dirty="0"/>
           </a:p>
         </p:txBody>
       </p:sp>
@@ -22143,12 +22768,161 @@
           </a:p>
         </p:txBody>
       </p:sp>
+    </p:spTree>
+    <p:extLst>
+      <p:ext uri="{BB962C8B-B14F-4D97-AF65-F5344CB8AC3E}">
+        <p14:creationId xmlns:p14="http://schemas.microsoft.com/office/powerpoint/2010/main" val="927065859"/>
+      </p:ext>
+    </p:extLst>
+  </p:cSld>
+  <p:clrMapOvr>
+    <a:masterClrMapping/>
+  </p:clrMapOvr>
+</p:sld>
+</file>
+
+<file path=ppt/slides/slide14.xml><?xml version="1.0" encoding="utf-8"?>
+<p:sld xmlns:a="http://schemas.openxmlformats.org/drawingml/2006/main" xmlns:r="http://schemas.openxmlformats.org/officeDocument/2006/relationships" xmlns:p="http://schemas.openxmlformats.org/presentationml/2006/main">
+  <p:cSld>
+    <p:spTree>
+      <p:nvGrpSpPr>
+        <p:cNvPr id="1" name=""/>
+        <p:cNvGrpSpPr/>
+        <p:nvPr/>
+      </p:nvGrpSpPr>
+      <p:grpSpPr>
+        <a:xfrm>
+          <a:off x="0" y="0"/>
+          <a:ext cx="0" cy="0"/>
+          <a:chOff x="0" y="0"/>
+          <a:chExt cx="0" cy="0"/>
+        </a:xfrm>
+      </p:grpSpPr>
+      <p:sp>
+        <p:nvSpPr>
+          <p:cNvPr id="2" name="Inhaltsplatzhalter 1">
+            <a:extLst>
+              <a:ext uri="{FF2B5EF4-FFF2-40B4-BE49-F238E27FC236}">
+                <a16:creationId xmlns:a16="http://schemas.microsoft.com/office/drawing/2014/main" id="{CCB24830-1F4C-428D-9214-7C8500A3F887}"/>
+              </a:ext>
+            </a:extLst>
+          </p:cNvPr>
+          <p:cNvSpPr>
+            <a:spLocks noGrp="1"/>
+          </p:cNvSpPr>
+          <p:nvPr>
+            <p:ph idx="10"/>
+          </p:nvPr>
+        </p:nvSpPr>
+        <p:spPr/>
+        <p:txBody>
+          <a:bodyPr/>
+          <a:lstStyle/>
+          <a:p>
+            <a:r>
+              <a:rPr lang="en-US" dirty="0"/>
+              <a:t>1. Syllabification (SYL)</a:t>
+            </a:r>
+          </a:p>
+          <a:p>
+            <a:r>
+              <a:rPr lang="en-US" dirty="0"/>
+              <a:t>2. Phonetic transcription (PT)</a:t>
+            </a:r>
+          </a:p>
+          <a:p>
+            <a:r>
+              <a:rPr lang="en-US" dirty="0"/>
+              <a:t>3. Part-of-speech tagging (POT)</a:t>
+            </a:r>
+          </a:p>
+          <a:p>
+            <a:r>
+              <a:rPr lang="en-US" dirty="0"/>
+              <a:t>4. Lexical stress prediction (LSP)</a:t>
+            </a:r>
+          </a:p>
+          <a:p>
+            <a:r>
+              <a:rPr lang="en-US" dirty="0"/>
+              <a:t>	-&gt; Only front-end</a:t>
+            </a:r>
+          </a:p>
+        </p:txBody>
+      </p:sp>
+      <p:sp>
+        <p:nvSpPr>
+          <p:cNvPr id="3" name="Foliennummernplatzhalter 2">
+            <a:extLst>
+              <a:ext uri="{FF2B5EF4-FFF2-40B4-BE49-F238E27FC236}">
+                <a16:creationId xmlns:a16="http://schemas.microsoft.com/office/drawing/2014/main" id="{6C810AEA-BBE2-44B1-88DD-478EA67CF34D}"/>
+              </a:ext>
+            </a:extLst>
+          </p:cNvPr>
+          <p:cNvSpPr>
+            <a:spLocks noGrp="1"/>
+          </p:cNvSpPr>
+          <p:nvPr>
+            <p:ph type="sldNum" sz="quarter" idx="11"/>
+          </p:nvPr>
+        </p:nvSpPr>
+        <p:spPr/>
+        <p:txBody>
+          <a:bodyPr/>
+          <a:lstStyle/>
+          <a:p>
+            <a:fld id="{CE58CB1E-F828-4F11-99E0-327109AF9DA4}" type="slidenum">
+              <a:rPr lang="de-DE" smtClean="0"/>
+              <a:pPr/>
+              <a:t>14</a:t>
+            </a:fld>
+            <a:endParaRPr lang="de-DE" dirty="0"/>
+          </a:p>
+        </p:txBody>
+      </p:sp>
+      <p:sp>
+        <p:nvSpPr>
+          <p:cNvPr id="4" name="Titel 3">
+            <a:extLst>
+              <a:ext uri="{FF2B5EF4-FFF2-40B4-BE49-F238E27FC236}">
+                <a16:creationId xmlns:a16="http://schemas.microsoft.com/office/drawing/2014/main" id="{A25736C8-94FE-4213-9737-485C428229B7}"/>
+              </a:ext>
+            </a:extLst>
+          </p:cNvPr>
+          <p:cNvSpPr>
+            <a:spLocks noGrp="1"/>
+          </p:cNvSpPr>
+          <p:nvPr>
+            <p:ph type="title"/>
+          </p:nvPr>
+        </p:nvSpPr>
+        <p:spPr>
+          <a:xfrm>
+            <a:off x="319090" y="994334"/>
+            <a:ext cx="8508999" cy="410369"/>
+          </a:xfrm>
+        </p:spPr>
+        <p:txBody>
+          <a:bodyPr/>
+          <a:lstStyle/>
+          <a:p>
+            <a:r>
+              <a:rPr lang="de-DE" dirty="0"/>
+              <a:t>Speech</a:t>
+            </a:r>
+            <a:r>
+              <a:rPr lang="en-US" dirty="0"/>
+              <a:t> Synthesis on Mobile Devices</a:t>
+            </a:r>
+          </a:p>
+        </p:txBody>
+      </p:sp>
       <p:grpSp>
         <p:nvGrpSpPr>
-          <p:cNvPr id="7" name="Gruppieren 6">
+          <p:cNvPr id="10" name="Gruppieren 9">
             <a:extLst>
               <a:ext uri="{FF2B5EF4-FFF2-40B4-BE49-F238E27FC236}">
-                <a16:creationId xmlns:a16="http://schemas.microsoft.com/office/drawing/2014/main" id="{ECF3C7FE-696E-4765-9CE6-46076DD1CCBC}"/>
+                <a16:creationId xmlns:a16="http://schemas.microsoft.com/office/drawing/2014/main" id="{418A0F66-3EDE-4E7E-B528-96CD270B9BB4}"/>
               </a:ext>
             </a:extLst>
           </p:cNvPr>
@@ -22157,18 +22931,18 @@
         </p:nvGrpSpPr>
         <p:grpSpPr>
           <a:xfrm>
-            <a:off x="867252" y="3429131"/>
-            <a:ext cx="7301388" cy="1839636"/>
-            <a:chOff x="867252" y="3429131"/>
-            <a:chExt cx="7301388" cy="1839636"/>
+            <a:off x="807720" y="4678914"/>
+            <a:ext cx="6804660" cy="1664212"/>
+            <a:chOff x="807720" y="3265755"/>
+            <a:chExt cx="6804660" cy="1664212"/>
           </a:xfrm>
         </p:grpSpPr>
         <p:pic>
           <p:nvPicPr>
-            <p:cNvPr id="5" name="Grafik 4">
+            <p:cNvPr id="8" name="Grafik 7">
               <a:extLst>
                 <a:ext uri="{FF2B5EF4-FFF2-40B4-BE49-F238E27FC236}">
-                  <a16:creationId xmlns:a16="http://schemas.microsoft.com/office/drawing/2014/main" id="{FF79F059-3C1D-4F72-AF31-8141827FCD94}"/>
+                  <a16:creationId xmlns:a16="http://schemas.microsoft.com/office/drawing/2014/main" id="{DDBA4D22-231E-43CC-99C2-87CB19CD6FB7}"/>
                 </a:ext>
               </a:extLst>
             </p:cNvPr>
@@ -22185,8 +22959,8 @@
           </p:blipFill>
           <p:spPr>
             <a:xfrm>
-              <a:off x="867252" y="3429131"/>
-              <a:ext cx="7301388" cy="1569590"/>
+              <a:off x="807720" y="3265755"/>
+              <a:ext cx="6804660" cy="1346505"/>
             </a:xfrm>
             <a:prstGeom prst="rect">
               <a:avLst/>
@@ -22195,10 +22969,10 @@
         </p:pic>
         <p:sp>
           <p:nvSpPr>
-            <p:cNvPr id="6" name="Textfeld 5">
+            <p:cNvPr id="9" name="Textfeld 8">
               <a:extLst>
                 <a:ext uri="{FF2B5EF4-FFF2-40B4-BE49-F238E27FC236}">
-                  <a16:creationId xmlns:a16="http://schemas.microsoft.com/office/drawing/2014/main" id="{D2830F31-C826-4FC5-9AB5-A74B42510CA1}"/>
+                  <a16:creationId xmlns:a16="http://schemas.microsoft.com/office/drawing/2014/main" id="{35F45026-AB4B-41A6-92FB-6F8A4216DA49}"/>
                 </a:ext>
               </a:extLst>
             </p:cNvPr>
@@ -22207,7 +22981,7 @@
           </p:nvSpPr>
           <p:spPr>
             <a:xfrm>
-              <a:off x="951072" y="5081246"/>
+              <a:off x="882429" y="4742446"/>
               <a:ext cx="625123" cy="187521"/>
             </a:xfrm>
             <a:prstGeom prst="rect">
@@ -22239,20 +23013,360 @@
           </p:txBody>
         </p:sp>
       </p:grpSp>
+      <p:grpSp>
+        <p:nvGrpSpPr>
+          <p:cNvPr id="6" name="Gruppieren 5">
+            <a:extLst>
+              <a:ext uri="{FF2B5EF4-FFF2-40B4-BE49-F238E27FC236}">
+                <a16:creationId xmlns:a16="http://schemas.microsoft.com/office/drawing/2014/main" id="{DCA146C5-7599-4752-B526-490E8DB73F19}"/>
+              </a:ext>
+            </a:extLst>
+          </p:cNvPr>
+          <p:cNvGrpSpPr/>
+          <p:nvPr/>
+        </p:nvGrpSpPr>
+        <p:grpSpPr>
+          <a:xfrm>
+            <a:off x="2499360" y="5036507"/>
+            <a:ext cx="5007094" cy="988912"/>
+            <a:chOff x="2499360" y="3623348"/>
+            <a:chExt cx="5007094" cy="988912"/>
+          </a:xfrm>
+        </p:grpSpPr>
+        <p:sp>
+          <p:nvSpPr>
+            <p:cNvPr id="5" name="Rechteck: abgerundete Ecken 4">
+              <a:extLst>
+                <a:ext uri="{FF2B5EF4-FFF2-40B4-BE49-F238E27FC236}">
+                  <a16:creationId xmlns:a16="http://schemas.microsoft.com/office/drawing/2014/main" id="{BD70C527-DB5A-4FAA-A9B8-C5AE4DD08D6A}"/>
+                </a:ext>
+              </a:extLst>
+            </p:cNvPr>
+            <p:cNvSpPr/>
+            <p:nvPr/>
+          </p:nvSpPr>
+          <p:spPr>
+            <a:xfrm>
+              <a:off x="2499360" y="3623348"/>
+              <a:ext cx="662940" cy="988912"/>
+            </a:xfrm>
+            <a:prstGeom prst="roundRect">
+              <a:avLst/>
+            </a:prstGeom>
+            <a:noFill/>
+            <a:ln w="28575">
+              <a:solidFill>
+                <a:srgbClr val="E37222"/>
+              </a:solidFill>
+            </a:ln>
+          </p:spPr>
+          <p:style>
+            <a:lnRef idx="2">
+              <a:schemeClr val="accent1">
+                <a:shade val="50000"/>
+              </a:schemeClr>
+            </a:lnRef>
+            <a:fillRef idx="1">
+              <a:schemeClr val="accent1"/>
+            </a:fillRef>
+            <a:effectRef idx="0">
+              <a:schemeClr val="accent1"/>
+            </a:effectRef>
+            <a:fontRef idx="minor">
+              <a:schemeClr val="lt1"/>
+            </a:fontRef>
+          </p:style>
+          <p:txBody>
+            <a:bodyPr rot="0" spcFirstLastPara="0" vertOverflow="overflow" horzOverflow="overflow" vert="horz" wrap="square" lIns="91440" tIns="45720" rIns="91440" bIns="45720" numCol="1" spcCol="0" rtlCol="0" fromWordArt="0" anchor="t" anchorCtr="0" forceAA="0" compatLnSpc="1">
+              <a:prstTxWarp prst="textNoShape">
+                <a:avLst/>
+              </a:prstTxWarp>
+              <a:noAutofit/>
+            </a:bodyPr>
+            <a:lstStyle/>
+            <a:p>
+              <a:pPr algn="ctr">
+                <a:lnSpc>
+                  <a:spcPct val="114000"/>
+                </a:lnSpc>
+              </a:pPr>
+              <a:endParaRPr lang="en-US" dirty="0"/>
+            </a:p>
+          </p:txBody>
+        </p:sp>
+        <p:sp>
+          <p:nvSpPr>
+            <p:cNvPr id="11" name="Rechteck: abgerundete Ecken 10">
+              <a:extLst>
+                <a:ext uri="{FF2B5EF4-FFF2-40B4-BE49-F238E27FC236}">
+                  <a16:creationId xmlns:a16="http://schemas.microsoft.com/office/drawing/2014/main" id="{FE0BAD50-E029-475F-8409-EF21DC15AB0B}"/>
+                </a:ext>
+              </a:extLst>
+            </p:cNvPr>
+            <p:cNvSpPr/>
+            <p:nvPr/>
+          </p:nvSpPr>
+          <p:spPr>
+            <a:xfrm>
+              <a:off x="3941127" y="3623348"/>
+              <a:ext cx="662940" cy="988912"/>
+            </a:xfrm>
+            <a:prstGeom prst="roundRect">
+              <a:avLst/>
+            </a:prstGeom>
+            <a:noFill/>
+            <a:ln w="28575">
+              <a:solidFill>
+                <a:srgbClr val="E37222"/>
+              </a:solidFill>
+            </a:ln>
+          </p:spPr>
+          <p:style>
+            <a:lnRef idx="2">
+              <a:schemeClr val="accent1">
+                <a:shade val="50000"/>
+              </a:schemeClr>
+            </a:lnRef>
+            <a:fillRef idx="1">
+              <a:schemeClr val="accent1"/>
+            </a:fillRef>
+            <a:effectRef idx="0">
+              <a:schemeClr val="accent1"/>
+            </a:effectRef>
+            <a:fontRef idx="minor">
+              <a:schemeClr val="lt1"/>
+            </a:fontRef>
+          </p:style>
+          <p:txBody>
+            <a:bodyPr rot="0" spcFirstLastPara="0" vertOverflow="overflow" horzOverflow="overflow" vert="horz" wrap="square" lIns="91440" tIns="45720" rIns="91440" bIns="45720" numCol="1" spcCol="0" rtlCol="0" fromWordArt="0" anchor="t" anchorCtr="0" forceAA="0" compatLnSpc="1">
+              <a:prstTxWarp prst="textNoShape">
+                <a:avLst/>
+              </a:prstTxWarp>
+              <a:noAutofit/>
+            </a:bodyPr>
+            <a:lstStyle/>
+            <a:p>
+              <a:pPr algn="ctr">
+                <a:lnSpc>
+                  <a:spcPct val="114000"/>
+                </a:lnSpc>
+              </a:pPr>
+              <a:endParaRPr lang="en-US" dirty="0"/>
+            </a:p>
+          </p:txBody>
+        </p:sp>
+        <p:sp>
+          <p:nvSpPr>
+            <p:cNvPr id="12" name="Rechteck: abgerundete Ecken 11">
+              <a:extLst>
+                <a:ext uri="{FF2B5EF4-FFF2-40B4-BE49-F238E27FC236}">
+                  <a16:creationId xmlns:a16="http://schemas.microsoft.com/office/drawing/2014/main" id="{42EBE3DA-817E-4B54-9972-6592AB20D33A}"/>
+                </a:ext>
+              </a:extLst>
+            </p:cNvPr>
+            <p:cNvSpPr/>
+            <p:nvPr/>
+          </p:nvSpPr>
+          <p:spPr>
+            <a:xfrm>
+              <a:off x="5413374" y="3623348"/>
+              <a:ext cx="662940" cy="988912"/>
+            </a:xfrm>
+            <a:prstGeom prst="roundRect">
+              <a:avLst/>
+            </a:prstGeom>
+            <a:noFill/>
+            <a:ln w="28575">
+              <a:solidFill>
+                <a:srgbClr val="E37222"/>
+              </a:solidFill>
+            </a:ln>
+          </p:spPr>
+          <p:style>
+            <a:lnRef idx="2">
+              <a:schemeClr val="accent1">
+                <a:shade val="50000"/>
+              </a:schemeClr>
+            </a:lnRef>
+            <a:fillRef idx="1">
+              <a:schemeClr val="accent1"/>
+            </a:fillRef>
+            <a:effectRef idx="0">
+              <a:schemeClr val="accent1"/>
+            </a:effectRef>
+            <a:fontRef idx="minor">
+              <a:schemeClr val="lt1"/>
+            </a:fontRef>
+          </p:style>
+          <p:txBody>
+            <a:bodyPr rot="0" spcFirstLastPara="0" vertOverflow="overflow" horzOverflow="overflow" vert="horz" wrap="square" lIns="91440" tIns="45720" rIns="91440" bIns="45720" numCol="1" spcCol="0" rtlCol="0" fromWordArt="0" anchor="t" anchorCtr="0" forceAA="0" compatLnSpc="1">
+              <a:prstTxWarp prst="textNoShape">
+                <a:avLst/>
+              </a:prstTxWarp>
+              <a:noAutofit/>
+            </a:bodyPr>
+            <a:lstStyle/>
+            <a:p>
+              <a:pPr algn="ctr">
+                <a:lnSpc>
+                  <a:spcPct val="114000"/>
+                </a:lnSpc>
+              </a:pPr>
+              <a:endParaRPr lang="en-US" dirty="0"/>
+            </a:p>
+          </p:txBody>
+        </p:sp>
+        <p:sp>
+          <p:nvSpPr>
+            <p:cNvPr id="13" name="Rechteck: abgerundete Ecken 12">
+              <a:extLst>
+                <a:ext uri="{FF2B5EF4-FFF2-40B4-BE49-F238E27FC236}">
+                  <a16:creationId xmlns:a16="http://schemas.microsoft.com/office/drawing/2014/main" id="{4BEE7633-F475-42B3-BB17-8920BF0F96E0}"/>
+                </a:ext>
+              </a:extLst>
+            </p:cNvPr>
+            <p:cNvSpPr/>
+            <p:nvPr/>
+          </p:nvSpPr>
+          <p:spPr>
+            <a:xfrm>
+              <a:off x="6843514" y="3623348"/>
+              <a:ext cx="662940" cy="988912"/>
+            </a:xfrm>
+            <a:prstGeom prst="roundRect">
+              <a:avLst/>
+            </a:prstGeom>
+            <a:noFill/>
+            <a:ln w="28575">
+              <a:solidFill>
+                <a:srgbClr val="E37222"/>
+              </a:solidFill>
+            </a:ln>
+          </p:spPr>
+          <p:style>
+            <a:lnRef idx="2">
+              <a:schemeClr val="accent1">
+                <a:shade val="50000"/>
+              </a:schemeClr>
+            </a:lnRef>
+            <a:fillRef idx="1">
+              <a:schemeClr val="accent1"/>
+            </a:fillRef>
+            <a:effectRef idx="0">
+              <a:schemeClr val="accent1"/>
+            </a:effectRef>
+            <a:fontRef idx="minor">
+              <a:schemeClr val="lt1"/>
+            </a:fontRef>
+          </p:style>
+          <p:txBody>
+            <a:bodyPr rot="0" spcFirstLastPara="0" vertOverflow="overflow" horzOverflow="overflow" vert="horz" wrap="square" lIns="91440" tIns="45720" rIns="91440" bIns="45720" numCol="1" spcCol="0" rtlCol="0" fromWordArt="0" anchor="t" anchorCtr="0" forceAA="0" compatLnSpc="1">
+              <a:prstTxWarp prst="textNoShape">
+                <a:avLst/>
+              </a:prstTxWarp>
+              <a:noAutofit/>
+            </a:bodyPr>
+            <a:lstStyle/>
+            <a:p>
+              <a:pPr algn="ctr">
+                <a:lnSpc>
+                  <a:spcPct val="114000"/>
+                </a:lnSpc>
+              </a:pPr>
+              <a:endParaRPr lang="en-US" dirty="0"/>
+            </a:p>
+          </p:txBody>
+        </p:sp>
+      </p:grpSp>
     </p:spTree>
     <p:extLst>
       <p:ext uri="{BB962C8B-B14F-4D97-AF65-F5344CB8AC3E}">
-        <p14:creationId xmlns:p14="http://schemas.microsoft.com/office/powerpoint/2010/main" val="927065859"/>
+        <p14:creationId xmlns:p14="http://schemas.microsoft.com/office/powerpoint/2010/main" val="4217063337"/>
       </p:ext>
     </p:extLst>
   </p:cSld>
   <p:clrMapOvr>
     <a:masterClrMapping/>
   </p:clrMapOvr>
+  <p:timing>
+    <p:tnLst>
+      <p:par>
+        <p:cTn id="1" dur="indefinite" restart="never" nodeType="tmRoot">
+          <p:childTnLst>
+            <p:seq concurrent="1" nextAc="seek">
+              <p:cTn id="2" dur="indefinite" nodeType="mainSeq">
+                <p:childTnLst>
+                  <p:par>
+                    <p:cTn id="3" fill="hold">
+                      <p:stCondLst>
+                        <p:cond delay="indefinite"/>
+                      </p:stCondLst>
+                      <p:childTnLst>
+                        <p:par>
+                          <p:cTn id="4" fill="hold">
+                            <p:stCondLst>
+                              <p:cond delay="0"/>
+                            </p:stCondLst>
+                            <p:childTnLst>
+                              <p:par>
+                                <p:cTn id="5" presetID="1" presetClass="entr" presetSubtype="0" fill="hold" nodeType="clickEffect">
+                                  <p:stCondLst>
+                                    <p:cond delay="0"/>
+                                  </p:stCondLst>
+                                  <p:childTnLst>
+                                    <p:set>
+                                      <p:cBhvr>
+                                        <p:cTn id="6" dur="1" fill="hold">
+                                          <p:stCondLst>
+                                            <p:cond delay="0"/>
+                                          </p:stCondLst>
+                                        </p:cTn>
+                                        <p:tgtEl>
+                                          <p:spTgt spid="6"/>
+                                        </p:tgtEl>
+                                        <p:attrNameLst>
+                                          <p:attrName>style.visibility</p:attrName>
+                                        </p:attrNameLst>
+                                      </p:cBhvr>
+                                      <p:to>
+                                        <p:strVal val="visible"/>
+                                      </p:to>
+                                    </p:set>
+                                  </p:childTnLst>
+                                </p:cTn>
+                              </p:par>
+                            </p:childTnLst>
+                          </p:cTn>
+                        </p:par>
+                      </p:childTnLst>
+                    </p:cTn>
+                  </p:par>
+                </p:childTnLst>
+              </p:cTn>
+              <p:prevCondLst>
+                <p:cond evt="onPrev" delay="0">
+                  <p:tgtEl>
+                    <p:sldTgt/>
+                  </p:tgtEl>
+                </p:cond>
+              </p:prevCondLst>
+              <p:nextCondLst>
+                <p:cond evt="onNext" delay="0">
+                  <p:tgtEl>
+                    <p:sldTgt/>
+                  </p:tgtEl>
+                </p:cond>
+              </p:nextCondLst>
+            </p:seq>
+          </p:childTnLst>
+        </p:cTn>
+      </p:par>
+    </p:tnLst>
+  </p:timing>
 </p:sld>
 </file>
 
-<file path=ppt/slides/slide14.xml><?xml version="1.0" encoding="utf-8"?>
+<file path=ppt/slides/slide15.xml><?xml version="1.0" encoding="utf-8"?>
 <p:sld xmlns:a="http://schemas.openxmlformats.org/drawingml/2006/main" xmlns:r="http://schemas.openxmlformats.org/officeDocument/2006/relationships" xmlns:p="http://schemas.openxmlformats.org/presentationml/2006/main">
   <p:cSld>
     <p:spTree>
@@ -22467,7 +23581,7 @@
             <a:fld id="{CE58CB1E-F828-4F11-99E0-327109AF9DA4}" type="slidenum">
               <a:rPr lang="de-DE" smtClean="0"/>
               <a:pPr/>
-              <a:t>14</a:t>
+              <a:t>15</a:t>
             </a:fld>
             <a:endParaRPr lang="de-DE" dirty="0"/>
           </a:p>
@@ -22811,7 +23925,7 @@
 </p:sld>
 </file>
 
-<file path=ppt/slides/slide15.xml><?xml version="1.0" encoding="utf-8"?>
+<file path=ppt/slides/slide16.xml><?xml version="1.0" encoding="utf-8"?>
 <p:sld xmlns:a="http://schemas.openxmlformats.org/drawingml/2006/main" xmlns:r="http://schemas.openxmlformats.org/officeDocument/2006/relationships" xmlns:p="http://schemas.openxmlformats.org/presentationml/2006/main">
   <p:cSld>
     <p:spTree>
@@ -22852,7 +23966,7 @@
             <a:fld id="{CE58CB1E-F828-4F11-99E0-327109AF9DA4}" type="slidenum">
               <a:rPr lang="de-DE" smtClean="0"/>
               <a:pPr/>
-              <a:t>15</a:t>
+              <a:t>16</a:t>
             </a:fld>
             <a:endParaRPr lang="de-DE" dirty="0"/>
           </a:p>
@@ -22899,7 +24013,7 @@
           <p:nvPr>
             <p:extLst>
               <p:ext uri="{D42A27DB-BD31-4B8C-83A1-F6EECF244321}">
-                <p14:modId xmlns:p14="http://schemas.microsoft.com/office/powerpoint/2010/main" val="2880128889"/>
+                <p14:modId xmlns:p14="http://schemas.microsoft.com/office/powerpoint/2010/main" val="2191735205"/>
               </p:ext>
             </p:extLst>
           </p:nvPr>
@@ -23253,7 +24367,7 @@
 </p:sld>
 </file>
 
-<file path=ppt/slides/slide16.xml><?xml version="1.0" encoding="utf-8"?>
+<file path=ppt/slides/slide17.xml><?xml version="1.0" encoding="utf-8"?>
 <p:sld xmlns:a="http://schemas.openxmlformats.org/drawingml/2006/main" xmlns:r="http://schemas.openxmlformats.org/officeDocument/2006/relationships" xmlns:p="http://schemas.openxmlformats.org/presentationml/2006/main">
   <p:cSld>
     <p:spTree>
@@ -23294,7 +24408,7 @@
             <a:fld id="{CE58CB1E-F828-4F11-99E0-327109AF9DA4}" type="slidenum">
               <a:rPr lang="de-DE" smtClean="0"/>
               <a:pPr/>
-              <a:t>16</a:t>
+              <a:t>17</a:t>
             </a:fld>
             <a:endParaRPr lang="de-DE" dirty="0"/>
           </a:p>
@@ -23334,54 +24448,6 @@
           </a:p>
         </p:txBody>
       </p:sp>
-      <p:sp>
-        <p:nvSpPr>
-          <p:cNvPr id="2" name="Rechteck 1">
-            <a:extLst>
-              <a:ext uri="{FF2B5EF4-FFF2-40B4-BE49-F238E27FC236}">
-                <a16:creationId xmlns:a16="http://schemas.microsoft.com/office/drawing/2014/main" id="{E2AE0B6B-AC65-420B-8A32-AC61F1BE0F75}"/>
-              </a:ext>
-            </a:extLst>
-          </p:cNvPr>
-          <p:cNvSpPr/>
-          <p:nvPr/>
-        </p:nvSpPr>
-        <p:spPr>
-          <a:xfrm>
-            <a:off x="1559045" y="4331315"/>
-            <a:ext cx="6147837" cy="923330"/>
-          </a:xfrm>
-          <a:prstGeom prst="rect">
-            <a:avLst/>
-          </a:prstGeom>
-          <a:noFill/>
-        </p:spPr>
-        <p:txBody>
-          <a:bodyPr wrap="none" lIns="91440" tIns="45720" rIns="91440" bIns="45720">
-            <a:spAutoFit/>
-          </a:bodyPr>
-          <a:lstStyle/>
-          <a:p>
-            <a:pPr algn="ctr"/>
-            <a:r>
-              <a:rPr lang="de-DE" sz="5400" b="0" cap="none" spc="0" dirty="0">
-                <a:ln w="0"/>
-                <a:solidFill>
-                  <a:schemeClr val="accent1"/>
-                </a:solidFill>
-                <a:effectLst>
-                  <a:outerShdw blurRad="38100" dist="25400" dir="5400000" algn="ctr" rotWithShape="0">
-                    <a:srgbClr val="6E747A">
-                      <a:alpha val="43000"/>
-                    </a:srgbClr>
-                  </a:outerShdw>
-                </a:effectLst>
-              </a:rPr>
-              <a:t>Sound Playback ??</a:t>
-            </a:r>
-          </a:p>
-        </p:txBody>
-      </p:sp>
     </p:spTree>
     <p:extLst>
       <p:ext uri="{BB962C8B-B14F-4D97-AF65-F5344CB8AC3E}">
@@ -23395,7 +24461,155 @@
 </p:sld>
 </file>
 
-<file path=ppt/slides/slide17.xml><?xml version="1.0" encoding="utf-8"?>
+<file path=ppt/slides/slide18.xml><?xml version="1.0" encoding="utf-8"?>
+<p:sld xmlns:a="http://schemas.openxmlformats.org/drawingml/2006/main" xmlns:r="http://schemas.openxmlformats.org/officeDocument/2006/relationships" xmlns:p="http://schemas.openxmlformats.org/presentationml/2006/main" show="0">
+  <p:cSld>
+    <p:spTree>
+      <p:nvGrpSpPr>
+        <p:cNvPr id="1" name=""/>
+        <p:cNvGrpSpPr/>
+        <p:nvPr/>
+      </p:nvGrpSpPr>
+      <p:grpSpPr>
+        <a:xfrm>
+          <a:off x="0" y="0"/>
+          <a:ext cx="0" cy="0"/>
+          <a:chOff x="0" y="0"/>
+          <a:chExt cx="0" cy="0"/>
+        </a:xfrm>
+      </p:grpSpPr>
+      <p:sp>
+        <p:nvSpPr>
+          <p:cNvPr id="3" name="Foliennummernplatzhalter 2">
+            <a:extLst>
+              <a:ext uri="{FF2B5EF4-FFF2-40B4-BE49-F238E27FC236}">
+                <a16:creationId xmlns:a16="http://schemas.microsoft.com/office/drawing/2014/main" id="{A366489A-8C80-4D71-99AB-A1991302B570}"/>
+              </a:ext>
+            </a:extLst>
+          </p:cNvPr>
+          <p:cNvSpPr>
+            <a:spLocks noGrp="1"/>
+          </p:cNvSpPr>
+          <p:nvPr>
+            <p:ph type="sldNum" sz="quarter" idx="11"/>
+          </p:nvPr>
+        </p:nvSpPr>
+        <p:spPr/>
+        <p:txBody>
+          <a:bodyPr/>
+          <a:lstStyle/>
+          <a:p>
+            <a:fld id="{CE58CB1E-F828-4F11-99E0-327109AF9DA4}" type="slidenum">
+              <a:rPr lang="de-DE" smtClean="0"/>
+              <a:pPr/>
+              <a:t>18</a:t>
+            </a:fld>
+            <a:endParaRPr lang="de-DE" dirty="0"/>
+          </a:p>
+        </p:txBody>
+      </p:sp>
+      <p:sp>
+        <p:nvSpPr>
+          <p:cNvPr id="6" name="Titel 5">
+            <a:extLst>
+              <a:ext uri="{FF2B5EF4-FFF2-40B4-BE49-F238E27FC236}">
+                <a16:creationId xmlns:a16="http://schemas.microsoft.com/office/drawing/2014/main" id="{AF4FFFC7-AFD1-43AD-B0C0-CB8EF4855441}"/>
+              </a:ext>
+            </a:extLst>
+          </p:cNvPr>
+          <p:cNvSpPr>
+            <a:spLocks noGrp="1"/>
+          </p:cNvSpPr>
+          <p:nvPr>
+            <p:ph type="title"/>
+          </p:nvPr>
+        </p:nvSpPr>
+        <p:spPr/>
+        <p:txBody>
+          <a:bodyPr/>
+          <a:lstStyle/>
+          <a:p>
+            <a:r>
+              <a:rPr lang="de-DE" dirty="0" err="1"/>
+              <a:t>To</a:t>
+            </a:r>
+            <a:r>
+              <a:rPr lang="de-DE" dirty="0"/>
+              <a:t> Do:</a:t>
+            </a:r>
+            <a:endParaRPr lang="en-US" dirty="0"/>
+          </a:p>
+        </p:txBody>
+      </p:sp>
+      <p:sp>
+        <p:nvSpPr>
+          <p:cNvPr id="7" name="Inhaltsplatzhalter 1">
+            <a:extLst>
+              <a:ext uri="{FF2B5EF4-FFF2-40B4-BE49-F238E27FC236}">
+                <a16:creationId xmlns:a16="http://schemas.microsoft.com/office/drawing/2014/main" id="{023F1E19-4D86-40F0-A196-BB880250BBF1}"/>
+              </a:ext>
+            </a:extLst>
+          </p:cNvPr>
+          <p:cNvSpPr>
+            <a:spLocks noGrp="1"/>
+          </p:cNvSpPr>
+          <p:nvPr>
+            <p:ph idx="10"/>
+          </p:nvPr>
+        </p:nvSpPr>
+        <p:spPr>
+          <a:xfrm>
+            <a:off x="319088" y="1978720"/>
+            <a:ext cx="8508999" cy="4330640"/>
+          </a:xfrm>
+        </p:spPr>
+        <p:txBody>
+          <a:bodyPr/>
+          <a:lstStyle/>
+          <a:p>
+            <a:pPr marL="285750" indent="-285750">
+              <a:buFont typeface="Arial" panose="020B0604020202020204" pitchFamily="34" charset="0"/>
+              <a:buChar char="•"/>
+            </a:pPr>
+            <a:r>
+              <a:rPr lang="de-DE" dirty="0"/>
+              <a:t>Sources</a:t>
+            </a:r>
+          </a:p>
+          <a:p>
+            <a:pPr marL="285750" indent="-285750">
+              <a:buFont typeface="Arial" panose="020B0604020202020204" pitchFamily="34" charset="0"/>
+              <a:buChar char="•"/>
+            </a:pPr>
+            <a:r>
+              <a:rPr lang="de-DE" dirty="0"/>
+              <a:t>Sounds </a:t>
+            </a:r>
+            <a:r>
+              <a:rPr lang="de-DE" dirty="0" err="1"/>
+              <a:t>as</a:t>
+            </a:r>
+            <a:r>
+              <a:rPr lang="de-DE" dirty="0"/>
+              <a:t> Intro and Outro ?!</a:t>
+            </a:r>
+          </a:p>
+        </p:txBody>
+      </p:sp>
+    </p:spTree>
+    <p:extLst>
+      <p:ext uri="{BB962C8B-B14F-4D97-AF65-F5344CB8AC3E}">
+        <p14:creationId xmlns:p14="http://schemas.microsoft.com/office/powerpoint/2010/main" val="2315660020"/>
+      </p:ext>
+    </p:extLst>
+  </p:cSld>
+  <p:clrMapOvr>
+    <a:masterClrMapping/>
+  </p:clrMapOvr>
+</p:sld>
+</file>
+
+<file path=ppt/slides/slide19.xml><?xml version="1.0" encoding="utf-8"?>
 <p:sld xmlns:a="http://schemas.openxmlformats.org/drawingml/2006/main" xmlns:r="http://schemas.openxmlformats.org/officeDocument/2006/relationships" xmlns:p="http://schemas.openxmlformats.org/presentationml/2006/main" show="0">
   <p:cSld>
     <p:spTree>
@@ -23548,7 +24762,7 @@
             <a:fld id="{CE58CB1E-F828-4F11-99E0-327109AF9DA4}" type="slidenum">
               <a:rPr lang="de-DE" smtClean="0"/>
               <a:pPr/>
-              <a:t>17</a:t>
+              <a:t>19</a:t>
             </a:fld>
             <a:endParaRPr lang="de-DE" dirty="0"/>
           </a:p>
@@ -23623,7 +24837,186 @@
 </p:sld>
 </file>
 
-<file path=ppt/slides/slide18.xml><?xml version="1.0" encoding="utf-8"?>
+<file path=ppt/slides/slide2.xml><?xml version="1.0" encoding="utf-8"?>
+<p:sld xmlns:a="http://schemas.openxmlformats.org/drawingml/2006/main" xmlns:r="http://schemas.openxmlformats.org/officeDocument/2006/relationships" xmlns:p="http://schemas.openxmlformats.org/presentationml/2006/main">
+  <p:cSld>
+    <p:spTree>
+      <p:nvGrpSpPr>
+        <p:cNvPr id="1" name=""/>
+        <p:cNvGrpSpPr/>
+        <p:nvPr/>
+      </p:nvGrpSpPr>
+      <p:grpSpPr>
+        <a:xfrm>
+          <a:off x="0" y="0"/>
+          <a:ext cx="0" cy="0"/>
+          <a:chOff x="0" y="0"/>
+          <a:chExt cx="0" cy="0"/>
+        </a:xfrm>
+      </p:grpSpPr>
+      <p:pic>
+        <p:nvPicPr>
+          <p:cNvPr id="4" name="Bild 4" descr="TUM_Glockenturm.tif">
+            <a:extLst>
+              <a:ext uri="{FF2B5EF4-FFF2-40B4-BE49-F238E27FC236}">
+                <a16:creationId xmlns:a16="http://schemas.microsoft.com/office/drawing/2014/main" id="{6E1B4B54-6271-48C4-BF68-95E6A46C9AA9}"/>
+              </a:ext>
+            </a:extLst>
+          </p:cNvPr>
+          <p:cNvPicPr>
+            <a:picLocks noChangeAspect="1"/>
+          </p:cNvPicPr>
+          <p:nvPr/>
+        </p:nvPicPr>
+        <p:blipFill>
+          <a:blip r:embed="rId2"/>
+          <a:stretch>
+            <a:fillRect/>
+          </a:stretch>
+        </p:blipFill>
+        <p:spPr>
+          <a:xfrm>
+            <a:off x="4927101" y="3051360"/>
+            <a:ext cx="3892489" cy="3397419"/>
+          </a:xfrm>
+          <a:prstGeom prst="rect">
+            <a:avLst/>
+          </a:prstGeom>
+        </p:spPr>
+      </p:pic>
+      <p:sp>
+        <p:nvSpPr>
+          <p:cNvPr id="9" name="Inhaltsplatzhalter 2">
+            <a:extLst>
+              <a:ext uri="{FF2B5EF4-FFF2-40B4-BE49-F238E27FC236}">
+                <a16:creationId xmlns:a16="http://schemas.microsoft.com/office/drawing/2014/main" id="{7EC2C0AF-CED8-47C6-94F8-41D6EFFAB6EF}"/>
+              </a:ext>
+            </a:extLst>
+          </p:cNvPr>
+          <p:cNvSpPr>
+            <a:spLocks noGrp="1"/>
+          </p:cNvSpPr>
+          <p:nvPr>
+            <p:ph idx="10"/>
+          </p:nvPr>
+        </p:nvSpPr>
+        <p:spPr>
+          <a:xfrm>
+            <a:off x="319088" y="1962017"/>
+            <a:ext cx="8508999" cy="2085280"/>
+          </a:xfrm>
+        </p:spPr>
+        <p:txBody>
+          <a:bodyPr/>
+          <a:lstStyle/>
+          <a:p>
+            <a:r>
+              <a:rPr lang="de-DE" dirty="0"/>
+              <a:t>Hannes Bohnengel</a:t>
+            </a:r>
+          </a:p>
+          <a:p>
+            <a:r>
+              <a:rPr lang="en-US" dirty="0"/>
+              <a:t>Technical</a:t>
+            </a:r>
+            <a:r>
+              <a:rPr lang="de-DE" dirty="0"/>
+              <a:t> </a:t>
+            </a:r>
+            <a:r>
+              <a:rPr lang="en-US" dirty="0"/>
+              <a:t>University</a:t>
+            </a:r>
+            <a:r>
+              <a:rPr lang="de-DE" dirty="0"/>
+              <a:t> </a:t>
+            </a:r>
+            <a:r>
+              <a:rPr lang="de-DE" dirty="0" err="1"/>
+              <a:t>of</a:t>
+            </a:r>
+            <a:r>
+              <a:rPr lang="de-DE" dirty="0"/>
+              <a:t> Munich</a:t>
+            </a:r>
+          </a:p>
+          <a:p>
+            <a:r>
+              <a:rPr lang="en-US" dirty="0"/>
+              <a:t>TUM Department of Electrical and Computer Engineering</a:t>
+            </a:r>
+          </a:p>
+          <a:p>
+            <a:r>
+              <a:rPr lang="en-US" dirty="0"/>
+              <a:t>Chair of Real-Time Computer Systems</a:t>
+            </a:r>
+            <a:endParaRPr lang="de-DE" dirty="0"/>
+          </a:p>
+          <a:p>
+            <a:r>
+              <a:rPr lang="de-DE" dirty="0"/>
+              <a:t>Munich, 21 </a:t>
+            </a:r>
+            <a:r>
+              <a:rPr lang="de-DE" dirty="0" err="1"/>
+              <a:t>July</a:t>
+            </a:r>
+            <a:r>
+              <a:rPr lang="de-DE" dirty="0"/>
+              <a:t> 2017</a:t>
+            </a:r>
+            <a:endParaRPr dirty="0"/>
+          </a:p>
+        </p:txBody>
+      </p:sp>
+      <p:sp>
+        <p:nvSpPr>
+          <p:cNvPr id="7" name="Titel 6"/>
+          <p:cNvSpPr>
+            <a:spLocks noGrp="1"/>
+          </p:cNvSpPr>
+          <p:nvPr>
+            <p:ph type="title"/>
+          </p:nvPr>
+        </p:nvSpPr>
+        <p:spPr>
+          <a:xfrm>
+            <a:off x="319090" y="994334"/>
+            <a:ext cx="8508999" cy="482248"/>
+          </a:xfrm>
+        </p:spPr>
+        <p:txBody>
+          <a:bodyPr/>
+          <a:lstStyle/>
+          <a:p>
+            <a:pPr>
+              <a:lnSpc>
+                <a:spcPct val="114000"/>
+              </a:lnSpc>
+            </a:pPr>
+            <a:r>
+              <a:rPr lang="en-US" dirty="0"/>
+              <a:t>Final Presentation of Advanced Seminar</a:t>
+            </a:r>
+          </a:p>
+        </p:txBody>
+      </p:sp>
+    </p:spTree>
+    <p:extLst>
+      <p:ext uri="{BB962C8B-B14F-4D97-AF65-F5344CB8AC3E}">
+        <p14:creationId xmlns:p14="http://schemas.microsoft.com/office/powerpoint/2010/main" val="2086259993"/>
+      </p:ext>
+    </p:extLst>
+  </p:cSld>
+  <p:clrMapOvr>
+    <a:masterClrMapping/>
+  </p:clrMapOvr>
+</p:sld>
+</file>
+
+<file path=ppt/slides/slide20.xml><?xml version="1.0" encoding="utf-8"?>
 <p:sld xmlns:a="http://schemas.openxmlformats.org/drawingml/2006/main" xmlns:r="http://schemas.openxmlformats.org/officeDocument/2006/relationships" xmlns:p="http://schemas.openxmlformats.org/presentationml/2006/main" show="0">
   <p:cSld>
     <p:spTree>
@@ -23758,7 +25151,7 @@
             <a:fld id="{CE58CB1E-F828-4F11-99E0-327109AF9DA4}" type="slidenum">
               <a:rPr lang="de-DE" smtClean="0"/>
               <a:pPr/>
-              <a:t>18</a:t>
+              <a:t>20</a:t>
             </a:fld>
             <a:endParaRPr lang="de-DE" dirty="0"/>
           </a:p>
@@ -24560,7 +25953,7 @@
 </p:sld>
 </file>
 
-<file path=ppt/slides/slide19.xml><?xml version="1.0" encoding="utf-8"?>
+<file path=ppt/slides/slide21.xml><?xml version="1.0" encoding="utf-8"?>
 <p:sld xmlns:a="http://schemas.openxmlformats.org/drawingml/2006/main" xmlns:r="http://schemas.openxmlformats.org/officeDocument/2006/relationships" xmlns:p="http://schemas.openxmlformats.org/presentationml/2006/main" show="0">
   <p:cSld>
     <p:spTree>
@@ -24702,7 +26095,7 @@
             <a:fld id="{CE58CB1E-F828-4F11-99E0-327109AF9DA4}" type="slidenum">
               <a:rPr lang="de-DE" smtClean="0"/>
               <a:pPr/>
-              <a:t>19</a:t>
+              <a:t>21</a:t>
             </a:fld>
             <a:endParaRPr lang="de-DE" dirty="0"/>
           </a:p>
@@ -24932,186 +26325,7 @@
 </p:sld>
 </file>
 
-<file path=ppt/slides/slide2.xml><?xml version="1.0" encoding="utf-8"?>
-<p:sld xmlns:a="http://schemas.openxmlformats.org/drawingml/2006/main" xmlns:r="http://schemas.openxmlformats.org/officeDocument/2006/relationships" xmlns:p="http://schemas.openxmlformats.org/presentationml/2006/main">
-  <p:cSld>
-    <p:spTree>
-      <p:nvGrpSpPr>
-        <p:cNvPr id="1" name=""/>
-        <p:cNvGrpSpPr/>
-        <p:nvPr/>
-      </p:nvGrpSpPr>
-      <p:grpSpPr>
-        <a:xfrm>
-          <a:off x="0" y="0"/>
-          <a:ext cx="0" cy="0"/>
-          <a:chOff x="0" y="0"/>
-          <a:chExt cx="0" cy="0"/>
-        </a:xfrm>
-      </p:grpSpPr>
-      <p:pic>
-        <p:nvPicPr>
-          <p:cNvPr id="4" name="Bild 4" descr="TUM_Glockenturm.tif">
-            <a:extLst>
-              <a:ext uri="{FF2B5EF4-FFF2-40B4-BE49-F238E27FC236}">
-                <a16:creationId xmlns:a16="http://schemas.microsoft.com/office/drawing/2014/main" id="{6E1B4B54-6271-48C4-BF68-95E6A46C9AA9}"/>
-              </a:ext>
-            </a:extLst>
-          </p:cNvPr>
-          <p:cNvPicPr>
-            <a:picLocks noChangeAspect="1"/>
-          </p:cNvPicPr>
-          <p:nvPr/>
-        </p:nvPicPr>
-        <p:blipFill>
-          <a:blip r:embed="rId2"/>
-          <a:stretch>
-            <a:fillRect/>
-          </a:stretch>
-        </p:blipFill>
-        <p:spPr>
-          <a:xfrm>
-            <a:off x="4927101" y="3051360"/>
-            <a:ext cx="3892489" cy="3397419"/>
-          </a:xfrm>
-          <a:prstGeom prst="rect">
-            <a:avLst/>
-          </a:prstGeom>
-        </p:spPr>
-      </p:pic>
-      <p:sp>
-        <p:nvSpPr>
-          <p:cNvPr id="9" name="Inhaltsplatzhalter 2">
-            <a:extLst>
-              <a:ext uri="{FF2B5EF4-FFF2-40B4-BE49-F238E27FC236}">
-                <a16:creationId xmlns:a16="http://schemas.microsoft.com/office/drawing/2014/main" id="{7EC2C0AF-CED8-47C6-94F8-41D6EFFAB6EF}"/>
-              </a:ext>
-            </a:extLst>
-          </p:cNvPr>
-          <p:cNvSpPr>
-            <a:spLocks noGrp="1"/>
-          </p:cNvSpPr>
-          <p:nvPr>
-            <p:ph idx="10"/>
-          </p:nvPr>
-        </p:nvSpPr>
-        <p:spPr>
-          <a:xfrm>
-            <a:off x="319088" y="1962017"/>
-            <a:ext cx="8508999" cy="2085280"/>
-          </a:xfrm>
-        </p:spPr>
-        <p:txBody>
-          <a:bodyPr/>
-          <a:lstStyle/>
-          <a:p>
-            <a:r>
-              <a:rPr lang="de-DE" dirty="0"/>
-              <a:t>Hannes Bohnengel</a:t>
-            </a:r>
-          </a:p>
-          <a:p>
-            <a:r>
-              <a:rPr lang="en-US" dirty="0"/>
-              <a:t>Technical</a:t>
-            </a:r>
-            <a:r>
-              <a:rPr lang="de-DE" dirty="0"/>
-              <a:t> </a:t>
-            </a:r>
-            <a:r>
-              <a:rPr lang="en-US" dirty="0"/>
-              <a:t>University</a:t>
-            </a:r>
-            <a:r>
-              <a:rPr lang="de-DE" dirty="0"/>
-              <a:t> </a:t>
-            </a:r>
-            <a:r>
-              <a:rPr lang="de-DE" dirty="0" err="1"/>
-              <a:t>of</a:t>
-            </a:r>
-            <a:r>
-              <a:rPr lang="de-DE" dirty="0"/>
-              <a:t> Munich</a:t>
-            </a:r>
-          </a:p>
-          <a:p>
-            <a:r>
-              <a:rPr lang="en-US" dirty="0"/>
-              <a:t>TUM Department of Electrical and Computer Engineering</a:t>
-            </a:r>
-          </a:p>
-          <a:p>
-            <a:r>
-              <a:rPr lang="en-US" dirty="0"/>
-              <a:t>Chair of Real-Time Computer Systems</a:t>
-            </a:r>
-            <a:endParaRPr lang="de-DE" dirty="0"/>
-          </a:p>
-          <a:p>
-            <a:r>
-              <a:rPr lang="de-DE" dirty="0"/>
-              <a:t>Munich, 21 </a:t>
-            </a:r>
-            <a:r>
-              <a:rPr lang="de-DE" dirty="0" err="1"/>
-              <a:t>July</a:t>
-            </a:r>
-            <a:r>
-              <a:rPr lang="de-DE" dirty="0"/>
-              <a:t> 2017</a:t>
-            </a:r>
-            <a:endParaRPr dirty="0"/>
-          </a:p>
-        </p:txBody>
-      </p:sp>
-      <p:sp>
-        <p:nvSpPr>
-          <p:cNvPr id="7" name="Titel 6"/>
-          <p:cNvSpPr>
-            <a:spLocks noGrp="1"/>
-          </p:cNvSpPr>
-          <p:nvPr>
-            <p:ph type="title"/>
-          </p:nvPr>
-        </p:nvSpPr>
-        <p:spPr>
-          <a:xfrm>
-            <a:off x="319090" y="994334"/>
-            <a:ext cx="8508999" cy="482248"/>
-          </a:xfrm>
-        </p:spPr>
-        <p:txBody>
-          <a:bodyPr/>
-          <a:lstStyle/>
-          <a:p>
-            <a:pPr>
-              <a:lnSpc>
-                <a:spcPct val="114000"/>
-              </a:lnSpc>
-            </a:pPr>
-            <a:r>
-              <a:rPr lang="en-US" dirty="0"/>
-              <a:t>Final Presentation of Advanced Seminar</a:t>
-            </a:r>
-          </a:p>
-        </p:txBody>
-      </p:sp>
-    </p:spTree>
-    <p:extLst>
-      <p:ext uri="{BB962C8B-B14F-4D97-AF65-F5344CB8AC3E}">
-        <p14:creationId xmlns:p14="http://schemas.microsoft.com/office/powerpoint/2010/main" val="2086259993"/>
-      </p:ext>
-    </p:extLst>
-  </p:cSld>
-  <p:clrMapOvr>
-    <a:masterClrMapping/>
-  </p:clrMapOvr>
-</p:sld>
-</file>
-
-<file path=ppt/slides/slide20.xml><?xml version="1.0" encoding="utf-8"?>
+<file path=ppt/slides/slide22.xml><?xml version="1.0" encoding="utf-8"?>
 <p:sld xmlns:a="http://schemas.openxmlformats.org/drawingml/2006/main" xmlns:r="http://schemas.openxmlformats.org/officeDocument/2006/relationships" xmlns:p="http://schemas.openxmlformats.org/presentationml/2006/main" show="0">
   <p:cSld>
     <p:spTree>
@@ -25761,7 +26975,7 @@
             <a:fld id="{CE58CB1E-F828-4F11-99E0-327109AF9DA4}" type="slidenum">
               <a:rPr lang="de-DE" smtClean="0"/>
               <a:pPr/>
-              <a:t>20</a:t>
+              <a:t>22</a:t>
             </a:fld>
             <a:endParaRPr lang="de-DE" dirty="0"/>
           </a:p>
@@ -26021,7 +27235,7 @@
 </p:sld>
 </file>
 
-<file path=ppt/slides/slide21.xml><?xml version="1.0" encoding="utf-8"?>
+<file path=ppt/slides/slide23.xml><?xml version="1.0" encoding="utf-8"?>
 <p:sld xmlns:a="http://schemas.openxmlformats.org/drawingml/2006/main" xmlns:r="http://schemas.openxmlformats.org/officeDocument/2006/relationships" xmlns:p="http://schemas.openxmlformats.org/presentationml/2006/main" show="0">
   <p:cSld>
     <p:spTree>
@@ -26461,7 +27675,7 @@
             <a:fld id="{CE58CB1E-F828-4F11-99E0-327109AF9DA4}" type="slidenum">
               <a:rPr lang="de-DE" smtClean="0"/>
               <a:pPr/>
-              <a:t>21</a:t>
+              <a:t>23</a:t>
             </a:fld>
             <a:endParaRPr lang="de-DE" dirty="0"/>
           </a:p>
@@ -26721,7 +27935,7 @@
 </p:sld>
 </file>
 
-<file path=ppt/slides/slide22.xml><?xml version="1.0" encoding="utf-8"?>
+<file path=ppt/slides/slide24.xml><?xml version="1.0" encoding="utf-8"?>
 <p:sld xmlns:a="http://schemas.openxmlformats.org/drawingml/2006/main" xmlns:r="http://schemas.openxmlformats.org/officeDocument/2006/relationships" xmlns:p="http://schemas.openxmlformats.org/presentationml/2006/main" show="0">
   <p:cSld>
     <p:spTree>
@@ -26756,7 +27970,7 @@
             <a:fld id="{CE58CB1E-F828-4F11-99E0-327109AF9DA4}" type="slidenum">
               <a:rPr lang="de-DE" smtClean="0"/>
               <a:pPr/>
-              <a:t>22</a:t>
+              <a:t>24</a:t>
             </a:fld>
             <a:endParaRPr lang="de-DE" dirty="0"/>
           </a:p>
@@ -27033,7 +28247,7 @@
 </p:sld>
 </file>
 
-<file path=ppt/slides/slide23.xml><?xml version="1.0" encoding="utf-8"?>
+<file path=ppt/slides/slide25.xml><?xml version="1.0" encoding="utf-8"?>
 <p:sld xmlns:a="http://schemas.openxmlformats.org/drawingml/2006/main" xmlns:r="http://schemas.openxmlformats.org/officeDocument/2006/relationships" xmlns:p="http://schemas.openxmlformats.org/presentationml/2006/main" show="0">
   <p:cSld>
     <p:spTree>
@@ -27093,7 +28307,7 @@
             <a:fld id="{CE58CB1E-F828-4F11-99E0-327109AF9DA4}" type="slidenum">
               <a:rPr lang="de-DE" smtClean="0"/>
               <a:pPr/>
-              <a:t>23</a:t>
+              <a:t>25</a:t>
             </a:fld>
             <a:endParaRPr lang="de-DE" dirty="0"/>
           </a:p>
@@ -28203,7 +29417,7 @@
           <p:nvPr>
             <p:extLst>
               <p:ext uri="{D42A27DB-BD31-4B8C-83A1-F6EECF244321}">
-                <p14:modId xmlns:p14="http://schemas.microsoft.com/office/powerpoint/2010/main" val="3019877478"/>
+                <p14:modId xmlns:p14="http://schemas.microsoft.com/office/powerpoint/2010/main" val="2064641709"/>
               </p:ext>
             </p:extLst>
           </p:nvPr>
@@ -28710,7 +29924,11 @@
               </a:lnSpc>
             </a:pPr>
             <a:r>
-              <a:rPr lang="de-DE" sz="1400" b="1" dirty="0"/>
+              <a:rPr lang="de-DE" sz="1400" b="1" dirty="0">
+                <a:solidFill>
+                  <a:srgbClr val="DAD7CB"/>
+                </a:solidFill>
+              </a:rPr>
               <a:t>Natural Language Processing</a:t>
             </a:r>
           </a:p>
@@ -28720,7 +29938,11 @@
                 <a:spcPct val="114000"/>
               </a:lnSpc>
             </a:pPr>
-            <a:endParaRPr lang="de-DE" sz="1400" b="1" dirty="0"/>
+            <a:endParaRPr lang="de-DE" sz="1400" b="1" dirty="0">
+              <a:solidFill>
+                <a:srgbClr val="DAD7CB"/>
+              </a:solidFill>
+            </a:endParaRPr>
           </a:p>
           <a:p>
             <a:pPr marL="180975" indent="-180975">
@@ -28731,7 +29953,11 @@
               <a:buChar char="•"/>
             </a:pPr>
             <a:r>
-              <a:rPr lang="en-US" sz="1400" dirty="0"/>
+              <a:rPr lang="en-US" sz="1400" dirty="0">
+                <a:solidFill>
+                  <a:srgbClr val="DAD7CB"/>
+                </a:solidFill>
+              </a:rPr>
               <a:t>Part-of-speech tagging</a:t>
             </a:r>
           </a:p>
@@ -28744,7 +29970,11 @@
               <a:buChar char="•"/>
             </a:pPr>
             <a:r>
-              <a:rPr lang="en-US" sz="1400" dirty="0"/>
+              <a:rPr lang="en-US" sz="1400" dirty="0">
+                <a:solidFill>
+                  <a:srgbClr val="DAD7CB"/>
+                </a:solidFill>
+              </a:rPr>
               <a:t>Text normalization</a:t>
             </a:r>
           </a:p>
@@ -28757,7 +29987,11 @@
               <a:buChar char="•"/>
             </a:pPr>
             <a:r>
-              <a:rPr lang="en-US" sz="1400" dirty="0"/>
+              <a:rPr lang="en-US" sz="1400" dirty="0">
+                <a:solidFill>
+                  <a:srgbClr val="DAD7CB"/>
+                </a:solidFill>
+              </a:rPr>
               <a:t>Phonetic transcription</a:t>
             </a:r>
           </a:p>
@@ -28770,7 +30004,11 @@
               <a:buChar char="•"/>
             </a:pPr>
             <a:r>
-              <a:rPr lang="en-US" sz="1400" dirty="0"/>
+              <a:rPr lang="en-US" sz="1400" dirty="0">
+                <a:solidFill>
+                  <a:srgbClr val="DAD7CB"/>
+                </a:solidFill>
+              </a:rPr>
               <a:t>Syllabification</a:t>
             </a:r>
           </a:p>
@@ -28783,7 +30021,11 @@
               <a:buChar char="•"/>
             </a:pPr>
             <a:r>
-              <a:rPr lang="en-US" sz="1400" dirty="0"/>
+              <a:rPr lang="en-US" sz="1400" dirty="0">
+                <a:solidFill>
+                  <a:srgbClr val="DAD7CB"/>
+                </a:solidFill>
+              </a:rPr>
               <a:t>Stress prediction</a:t>
             </a:r>
           </a:p>
@@ -28796,10 +30038,18 @@
               <a:buChar char="•"/>
             </a:pPr>
             <a:r>
-              <a:rPr lang="en-US" sz="1400" dirty="0"/>
+              <a:rPr lang="en-US" sz="1400" dirty="0">
+                <a:solidFill>
+                  <a:srgbClr val="DAD7CB"/>
+                </a:solidFill>
+              </a:rPr>
               <a:t>Prosodic analysis</a:t>
             </a:r>
-            <a:endParaRPr lang="de-DE" sz="1400" dirty="0"/>
+            <a:endParaRPr lang="de-DE" sz="1400" dirty="0">
+              <a:solidFill>
+                <a:srgbClr val="DAD7CB"/>
+              </a:solidFill>
+            </a:endParaRPr>
           </a:p>
         </p:txBody>
       </p:sp>
@@ -28863,7 +30113,11 @@
               </a:lnSpc>
             </a:pPr>
             <a:r>
-              <a:rPr lang="de-DE" sz="1400" b="1" dirty="0"/>
+              <a:rPr lang="de-DE" sz="1400" b="1" dirty="0">
+                <a:solidFill>
+                  <a:srgbClr val="DAD7CB"/>
+                </a:solidFill>
+              </a:rPr>
               <a:t>Digital Signal </a:t>
             </a:r>
           </a:p>
@@ -28874,7 +30128,11 @@
               </a:lnSpc>
             </a:pPr>
             <a:r>
-              <a:rPr lang="de-DE" sz="1400" b="1" dirty="0"/>
+              <a:rPr lang="de-DE" sz="1400" b="1" dirty="0">
+                <a:solidFill>
+                  <a:srgbClr val="DAD7CB"/>
+                </a:solidFill>
+              </a:rPr>
               <a:t>Processing</a:t>
             </a:r>
           </a:p>
@@ -28884,7 +30142,11 @@
                 <a:spcPct val="114000"/>
               </a:lnSpc>
             </a:pPr>
-            <a:endParaRPr lang="de-DE" sz="1400" dirty="0"/>
+            <a:endParaRPr lang="de-DE" sz="1400" dirty="0">
+              <a:solidFill>
+                <a:srgbClr val="DAD7CB"/>
+              </a:solidFill>
+            </a:endParaRPr>
           </a:p>
           <a:p>
             <a:pPr>
@@ -28893,11 +30155,19 @@
               </a:lnSpc>
             </a:pPr>
             <a:r>
-              <a:rPr lang="de-DE" sz="1400" dirty="0"/>
+              <a:rPr lang="de-DE" sz="1400" dirty="0">
+                <a:solidFill>
+                  <a:srgbClr val="DAD7CB"/>
+                </a:solidFill>
+              </a:rPr>
               <a:t>Different </a:t>
             </a:r>
             <a:r>
-              <a:rPr lang="en-US" sz="1400" dirty="0"/>
+              <a:rPr lang="en-US" sz="1400" dirty="0">
+                <a:solidFill>
+                  <a:srgbClr val="DAD7CB"/>
+                </a:solidFill>
+              </a:rPr>
               <a:t>Synthesis Models</a:t>
             </a:r>
           </a:p>
@@ -28910,10 +30180,18 @@
               <a:buChar char="•"/>
             </a:pPr>
             <a:r>
-              <a:rPr lang="de-DE" sz="1400" dirty="0" err="1"/>
+              <a:rPr lang="de-DE" sz="1400" dirty="0" err="1">
+                <a:solidFill>
+                  <a:srgbClr val="DAD7CB"/>
+                </a:solidFill>
+              </a:rPr>
               <a:t>Parametric</a:t>
             </a:r>
-            <a:endParaRPr lang="de-DE" sz="1400" dirty="0"/>
+            <a:endParaRPr lang="de-DE" sz="1400" dirty="0">
+              <a:solidFill>
+                <a:srgbClr val="DAD7CB"/>
+              </a:solidFill>
+            </a:endParaRPr>
           </a:p>
           <a:p>
             <a:pPr marL="271463" lvl="1" indent="-174625">
@@ -28924,10 +30202,18 @@
               <a:buChar char="•"/>
             </a:pPr>
             <a:r>
-              <a:rPr lang="de-DE" sz="1400" dirty="0" err="1"/>
+              <a:rPr lang="de-DE" sz="1400" dirty="0" err="1">
+                <a:solidFill>
+                  <a:srgbClr val="DAD7CB"/>
+                </a:solidFill>
+              </a:rPr>
               <a:t>Concatenative</a:t>
             </a:r>
-            <a:endParaRPr lang="de-DE" sz="1400" dirty="0"/>
+            <a:endParaRPr lang="de-DE" sz="1400" dirty="0">
+              <a:solidFill>
+                <a:srgbClr val="DAD7CB"/>
+              </a:solidFill>
+            </a:endParaRPr>
           </a:p>
           <a:p>
             <a:pPr marL="271463" lvl="1" indent="-174625">
@@ -28938,14 +30224,26 @@
               <a:buChar char="•"/>
             </a:pPr>
             <a:r>
-              <a:rPr lang="de-DE" sz="1400" dirty="0"/>
+              <a:rPr lang="de-DE" sz="1400" dirty="0">
+                <a:solidFill>
+                  <a:srgbClr val="DAD7CB"/>
+                </a:solidFill>
+              </a:rPr>
               <a:t>Statistical </a:t>
             </a:r>
             <a:r>
-              <a:rPr lang="de-DE" sz="1400" dirty="0" err="1"/>
+              <a:rPr lang="de-DE" sz="1400" dirty="0" err="1">
+                <a:solidFill>
+                  <a:srgbClr val="DAD7CB"/>
+                </a:solidFill>
+              </a:rPr>
               <a:t>parametric</a:t>
             </a:r>
-            <a:endParaRPr lang="de-DE" sz="1400" dirty="0"/>
+            <a:endParaRPr lang="de-DE" sz="1400" dirty="0">
+              <a:solidFill>
+                <a:srgbClr val="DAD7CB"/>
+              </a:solidFill>
+            </a:endParaRPr>
           </a:p>
           <a:p>
             <a:pPr marL="446088" lvl="1" indent="-265113">
@@ -28955,7 +30253,11 @@
               <a:buFont typeface="Arial" panose="020B0604020202020204" pitchFamily="34" charset="0"/>
               <a:buChar char="→"/>
             </a:pPr>
-            <a:endParaRPr lang="de-DE" sz="1400" dirty="0"/>
+            <a:endParaRPr lang="de-DE" sz="1400" dirty="0">
+              <a:solidFill>
+                <a:srgbClr val="DAD7CB"/>
+              </a:solidFill>
+            </a:endParaRPr>
           </a:p>
         </p:txBody>
       </p:sp>
@@ -29249,7 +30551,7 @@
         </p:nvSpPr>
         <p:spPr>
           <a:xfrm>
-            <a:off x="1494963" y="2619586"/>
+            <a:off x="2023953" y="2619586"/>
             <a:ext cx="2340000" cy="540000"/>
           </a:xfrm>
           <a:prstGeom prst="roundRect">
@@ -29295,10 +30597,18 @@
               </a:lnSpc>
             </a:pPr>
             <a:r>
-              <a:rPr lang="de-DE" sz="1400" dirty="0"/>
+              <a:rPr lang="de-DE" sz="1400" dirty="0">
+                <a:solidFill>
+                  <a:srgbClr val="DAD7CB"/>
+                </a:solidFill>
+              </a:rPr>
               <a:t>Text Analysis</a:t>
             </a:r>
-            <a:endParaRPr lang="en-US" dirty="0"/>
+            <a:endParaRPr lang="en-US" dirty="0">
+              <a:solidFill>
+                <a:srgbClr val="DAD7CB"/>
+              </a:solidFill>
+            </a:endParaRPr>
           </a:p>
         </p:txBody>
       </p:sp>
@@ -29316,7 +30626,7 @@
         </p:nvSpPr>
         <p:spPr>
           <a:xfrm>
-            <a:off x="2664962" y="3339794"/>
+            <a:off x="3193952" y="3339794"/>
             <a:ext cx="2340000" cy="540000"/>
           </a:xfrm>
           <a:prstGeom prst="roundRect">
@@ -29362,14 +30672,26 @@
               </a:lnSpc>
             </a:pPr>
             <a:r>
-              <a:rPr lang="de-DE" sz="1400" dirty="0" err="1"/>
+              <a:rPr lang="de-DE" sz="1400" dirty="0" err="1">
+                <a:solidFill>
+                  <a:srgbClr val="DAD7CB"/>
+                </a:solidFill>
+              </a:rPr>
               <a:t>Acoustic</a:t>
             </a:r>
             <a:r>
-              <a:rPr lang="de-DE" sz="1400" dirty="0"/>
+              <a:rPr lang="de-DE" sz="1400" dirty="0">
+                <a:solidFill>
+                  <a:srgbClr val="DAD7CB"/>
+                </a:solidFill>
+              </a:rPr>
               <a:t> Model</a:t>
             </a:r>
-            <a:endParaRPr lang="en-US" sz="1400" dirty="0"/>
+            <a:endParaRPr lang="en-US" sz="1400" dirty="0">
+              <a:solidFill>
+                <a:srgbClr val="DAD7CB"/>
+              </a:solidFill>
+            </a:endParaRPr>
           </a:p>
         </p:txBody>
       </p:sp>
@@ -29387,7 +30709,7 @@
         </p:nvSpPr>
         <p:spPr>
           <a:xfrm>
-            <a:off x="3834962" y="4060002"/>
+            <a:off x="4363952" y="4060002"/>
             <a:ext cx="2340000" cy="540000"/>
           </a:xfrm>
           <a:prstGeom prst="roundRect">
@@ -29433,10 +30755,18 @@
               </a:lnSpc>
             </a:pPr>
             <a:r>
-              <a:rPr lang="de-DE" sz="1400" dirty="0"/>
+              <a:rPr lang="de-DE" sz="1400" dirty="0">
+                <a:solidFill>
+                  <a:srgbClr val="DAD7CB"/>
+                </a:solidFill>
+              </a:rPr>
               <a:t>Parameter Generation</a:t>
             </a:r>
-            <a:endParaRPr lang="en-US" sz="1400" dirty="0"/>
+            <a:endParaRPr lang="en-US" sz="1400" dirty="0">
+              <a:solidFill>
+                <a:srgbClr val="DAD7CB"/>
+              </a:solidFill>
+            </a:endParaRPr>
           </a:p>
         </p:txBody>
       </p:sp>
@@ -29454,7 +30784,7 @@
         </p:nvSpPr>
         <p:spPr>
           <a:xfrm>
-            <a:off x="5004962" y="4777263"/>
+            <a:off x="5533952" y="4777263"/>
             <a:ext cx="2340000" cy="540000"/>
           </a:xfrm>
           <a:prstGeom prst="roundRect">
@@ -29500,14 +30830,26 @@
               </a:lnSpc>
             </a:pPr>
             <a:r>
-              <a:rPr lang="de-DE" sz="1400" dirty="0" err="1"/>
+              <a:rPr lang="de-DE" sz="1400" dirty="0" err="1">
+                <a:solidFill>
+                  <a:srgbClr val="DAD7CB"/>
+                </a:solidFill>
+              </a:rPr>
               <a:t>Waveform</a:t>
             </a:r>
             <a:r>
-              <a:rPr lang="de-DE" sz="1400" dirty="0"/>
+              <a:rPr lang="de-DE" sz="1400" dirty="0">
+                <a:solidFill>
+                  <a:srgbClr val="DAD7CB"/>
+                </a:solidFill>
+              </a:rPr>
               <a:t> Synthesis</a:t>
             </a:r>
-            <a:endParaRPr lang="en-US" sz="1400" dirty="0"/>
+            <a:endParaRPr lang="en-US" sz="1400" dirty="0">
+              <a:solidFill>
+                <a:srgbClr val="DAD7CB"/>
+              </a:solidFill>
+            </a:endParaRPr>
           </a:p>
         </p:txBody>
       </p:sp>
@@ -29525,7 +30867,7 @@
         </p:nvSpPr>
         <p:spPr>
           <a:xfrm>
-            <a:off x="2115259" y="1641413"/>
+            <a:off x="2644249" y="1641413"/>
             <a:ext cx="1099404" cy="646331"/>
           </a:xfrm>
           <a:prstGeom prst="rect">
@@ -29594,7 +30936,7 @@
         </p:nvSpPr>
         <p:spPr>
           <a:xfrm>
-            <a:off x="5261890" y="5590272"/>
+            <a:off x="5790880" y="5590272"/>
             <a:ext cx="1826142" cy="646331"/>
           </a:xfrm>
           <a:prstGeom prst="rect">
@@ -29663,7 +31005,7 @@
         </p:nvSpPr>
         <p:spPr>
           <a:xfrm>
-            <a:off x="2512160" y="2233182"/>
+            <a:off x="3041150" y="2233182"/>
             <a:ext cx="305601" cy="334751"/>
           </a:xfrm>
           <a:prstGeom prst="downArrow">
@@ -29729,7 +31071,7 @@
         </p:nvSpPr>
         <p:spPr>
           <a:xfrm rot="5400000">
-            <a:off x="3914542" y="2786769"/>
+            <a:off x="4443532" y="2786769"/>
             <a:ext cx="488096" cy="538211"/>
           </a:xfrm>
           <a:prstGeom prst="bentArrow">
@@ -29799,7 +31141,7 @@
         </p:nvSpPr>
         <p:spPr>
           <a:xfrm rot="5400000">
-            <a:off x="5082360" y="3499871"/>
+            <a:off x="5611350" y="3499871"/>
             <a:ext cx="488096" cy="538211"/>
           </a:xfrm>
           <a:prstGeom prst="bentArrow">
@@ -29869,7 +31211,7 @@
         </p:nvSpPr>
         <p:spPr>
           <a:xfrm rot="5400000">
-            <a:off x="6244410" y="4217132"/>
+            <a:off x="6773400" y="4217132"/>
             <a:ext cx="488096" cy="538211"/>
           </a:xfrm>
           <a:prstGeom prst="bentArrow">
@@ -29939,7 +31281,7 @@
         </p:nvSpPr>
         <p:spPr>
           <a:xfrm>
-            <a:off x="6022160" y="5378658"/>
+            <a:off x="6551150" y="5378658"/>
             <a:ext cx="305601" cy="334751"/>
           </a:xfrm>
           <a:prstGeom prst="downArrow">
@@ -29991,82 +31333,121 @@
           </a:p>
         </p:txBody>
       </p:sp>
-      <p:cxnSp>
-        <p:nvCxnSpPr>
-          <p:cNvPr id="38" name="Gerade Verbindung mit Pfeil 37">
+      <p:grpSp>
+        <p:nvGrpSpPr>
+          <p:cNvPr id="19" name="Gruppieren 18">
             <a:extLst>
               <a:ext uri="{FF2B5EF4-FFF2-40B4-BE49-F238E27FC236}">
-                <a16:creationId xmlns:a16="http://schemas.microsoft.com/office/drawing/2014/main" id="{7C4980D7-1FE7-45A3-93B8-2EB140FA67F1}"/>
+                <a16:creationId xmlns:a16="http://schemas.microsoft.com/office/drawing/2014/main" id="{BB1BE610-A74E-4BD7-9EEC-BE072835FB5C}"/>
               </a:ext>
             </a:extLst>
           </p:cNvPr>
-          <p:cNvCxnSpPr>
-            <a:cxnSpLocks/>
-            <a:stCxn id="39" idx="1"/>
-          </p:cNvCxnSpPr>
+          <p:cNvGrpSpPr/>
           <p:nvPr/>
-        </p:nvCxnSpPr>
-        <p:spPr>
-          <a:xfrm flipH="1">
-            <a:off x="3834962" y="2275546"/>
-            <a:ext cx="2922602" cy="339364"/>
+        </p:nvGrpSpPr>
+        <p:grpSpPr>
+          <a:xfrm>
+            <a:off x="4363952" y="1983158"/>
+            <a:ext cx="3996935" cy="2047155"/>
+            <a:chOff x="4363952" y="1983158"/>
+            <a:chExt cx="3996935" cy="2047155"/>
           </a:xfrm>
-          <a:prstGeom prst="straightConnector1">
-            <a:avLst/>
-          </a:prstGeom>
-          <a:ln w="28575">
-            <a:solidFill>
-              <a:srgbClr val="E37222"/>
-            </a:solidFill>
-            <a:tailEnd type="triangle"/>
-          </a:ln>
-        </p:spPr>
-        <p:style>
-          <a:lnRef idx="1">
-            <a:schemeClr val="accent1"/>
-          </a:lnRef>
-          <a:fillRef idx="0">
-            <a:schemeClr val="accent1"/>
-          </a:fillRef>
-          <a:effectRef idx="0">
-            <a:schemeClr val="accent1"/>
-          </a:effectRef>
-          <a:fontRef idx="minor">
-            <a:schemeClr val="tx1"/>
-          </a:fontRef>
-        </p:style>
-      </p:cxnSp>
-      <p:sp>
-        <p:nvSpPr>
-          <p:cNvPr id="39" name="Rechteck 38">
-            <a:extLst>
-              <a:ext uri="{FF2B5EF4-FFF2-40B4-BE49-F238E27FC236}">
-                <a16:creationId xmlns:a16="http://schemas.microsoft.com/office/drawing/2014/main" id="{841A6620-8421-49EF-AAB4-1A20743B3264}"/>
-              </a:ext>
-            </a:extLst>
-          </p:cNvPr>
-          <p:cNvSpPr/>
-          <p:nvPr/>
-        </p:nvSpPr>
-        <p:spPr>
-          <a:xfrm>
-            <a:off x="6757564" y="1983158"/>
-            <a:ext cx="1074333" cy="584775"/>
-          </a:xfrm>
-          <a:prstGeom prst="rect">
-            <a:avLst/>
-          </a:prstGeom>
-          <a:noFill/>
-        </p:spPr>
-        <p:txBody>
-          <a:bodyPr wrap="none" lIns="91440" tIns="45720" rIns="91440" bIns="45720">
-            <a:spAutoFit/>
-          </a:bodyPr>
-          <a:lstStyle/>
-          <a:p>
-            <a:pPr algn="ctr"/>
-            <a:r>
-              <a:rPr lang="de-DE" sz="3200" b="1" cap="none" spc="0" dirty="0">
+        </p:grpSpPr>
+        <p:cxnSp>
+          <p:nvCxnSpPr>
+            <p:cNvPr id="38" name="Gerade Verbindung mit Pfeil 37">
+              <a:extLst>
+                <a:ext uri="{FF2B5EF4-FFF2-40B4-BE49-F238E27FC236}">
+                  <a16:creationId xmlns:a16="http://schemas.microsoft.com/office/drawing/2014/main" id="{7C4980D7-1FE7-45A3-93B8-2EB140FA67F1}"/>
+                </a:ext>
+              </a:extLst>
+            </p:cNvPr>
+            <p:cNvCxnSpPr>
+              <a:cxnSpLocks/>
+              <a:stCxn id="39" idx="1"/>
+            </p:cNvCxnSpPr>
+            <p:nvPr/>
+          </p:nvCxnSpPr>
+          <p:spPr>
+            <a:xfrm flipH="1">
+              <a:off x="4363952" y="2275546"/>
+              <a:ext cx="2922602" cy="339364"/>
+            </a:xfrm>
+            <a:prstGeom prst="straightConnector1">
+              <a:avLst/>
+            </a:prstGeom>
+            <a:ln w="28575">
+              <a:solidFill>
+                <a:srgbClr val="E37222"/>
+              </a:solidFill>
+              <a:tailEnd type="triangle"/>
+            </a:ln>
+          </p:spPr>
+          <p:style>
+            <a:lnRef idx="1">
+              <a:schemeClr val="accent1"/>
+            </a:lnRef>
+            <a:fillRef idx="0">
+              <a:schemeClr val="accent1"/>
+            </a:fillRef>
+            <a:effectRef idx="0">
+              <a:schemeClr val="accent1"/>
+            </a:effectRef>
+            <a:fontRef idx="minor">
+              <a:schemeClr val="tx1"/>
+            </a:fontRef>
+          </p:style>
+        </p:cxnSp>
+        <p:sp>
+          <p:nvSpPr>
+            <p:cNvPr id="39" name="Rechteck 38">
+              <a:extLst>
+                <a:ext uri="{FF2B5EF4-FFF2-40B4-BE49-F238E27FC236}">
+                  <a16:creationId xmlns:a16="http://schemas.microsoft.com/office/drawing/2014/main" id="{841A6620-8421-49EF-AAB4-1A20743B3264}"/>
+                </a:ext>
+              </a:extLst>
+            </p:cNvPr>
+            <p:cNvSpPr/>
+            <p:nvPr/>
+          </p:nvSpPr>
+          <p:spPr>
+            <a:xfrm>
+              <a:off x="7286554" y="1983158"/>
+              <a:ext cx="1074333" cy="584775"/>
+            </a:xfrm>
+            <a:prstGeom prst="rect">
+              <a:avLst/>
+            </a:prstGeom>
+            <a:noFill/>
+          </p:spPr>
+          <p:txBody>
+            <a:bodyPr wrap="none" lIns="91440" tIns="45720" rIns="91440" bIns="45720">
+              <a:spAutoFit/>
+            </a:bodyPr>
+            <a:lstStyle/>
+            <a:p>
+              <a:pPr algn="ctr"/>
+              <a:r>
+                <a:rPr lang="de-DE" sz="3200" b="1" cap="none" spc="0" dirty="0">
+                  <a:ln w="0">
+                    <a:solidFill>
+                      <a:srgbClr val="DAD7CB"/>
+                    </a:solidFill>
+                  </a:ln>
+                  <a:solidFill>
+                    <a:srgbClr val="E37222"/>
+                  </a:solidFill>
+                  <a:effectLst>
+                    <a:outerShdw blurRad="38100" dist="25400" dir="5400000" algn="ctr" rotWithShape="0">
+                      <a:srgbClr val="6E747A">
+                        <a:alpha val="43000"/>
+                      </a:srgbClr>
+                    </a:outerShdw>
+                  </a:effectLst>
+                </a:rPr>
+                <a:t>DNN</a:t>
+              </a:r>
+              <a:endParaRPr lang="de-DE" sz="5400" b="1" cap="none" spc="0" dirty="0">
                 <a:ln w="0">
                   <a:solidFill>
                     <a:srgbClr val="DAD7CB"/>
@@ -30082,119 +31463,301 @@
                     </a:srgbClr>
                   </a:outerShdw>
                 </a:effectLst>
-              </a:rPr>
-              <a:t>DNN</a:t>
-            </a:r>
-            <a:endParaRPr lang="de-DE" sz="5400" b="1" cap="none" spc="0" dirty="0">
-              <a:ln w="0">
-                <a:solidFill>
-                  <a:srgbClr val="DAD7CB"/>
-                </a:solidFill>
-              </a:ln>
+              </a:endParaRPr>
+            </a:p>
+          </p:txBody>
+        </p:sp>
+        <p:cxnSp>
+          <p:nvCxnSpPr>
+            <p:cNvPr id="42" name="Gerade Verbindung mit Pfeil 41">
+              <a:extLst>
+                <a:ext uri="{FF2B5EF4-FFF2-40B4-BE49-F238E27FC236}">
+                  <a16:creationId xmlns:a16="http://schemas.microsoft.com/office/drawing/2014/main" id="{4A8E720A-E1EC-4DF5-A205-14DAF71CA99B}"/>
+                </a:ext>
+              </a:extLst>
+            </p:cNvPr>
+            <p:cNvCxnSpPr>
+              <a:cxnSpLocks/>
+              <a:stCxn id="39" idx="1"/>
+            </p:cNvCxnSpPr>
+            <p:nvPr/>
+          </p:nvCxnSpPr>
+          <p:spPr>
+            <a:xfrm flipH="1">
+              <a:off x="5556251" y="2275546"/>
+              <a:ext cx="1730303" cy="1039337"/>
+            </a:xfrm>
+            <a:prstGeom prst="straightConnector1">
+              <a:avLst/>
+            </a:prstGeom>
+            <a:ln w="28575">
               <a:solidFill>
                 <a:srgbClr val="E37222"/>
               </a:solidFill>
-              <a:effectLst>
-                <a:outerShdw blurRad="38100" dist="25400" dir="5400000" algn="ctr" rotWithShape="0">
-                  <a:srgbClr val="6E747A">
-                    <a:alpha val="43000"/>
-                  </a:srgbClr>
-                </a:outerShdw>
-              </a:effectLst>
-            </a:endParaRPr>
-          </a:p>
-        </p:txBody>
-      </p:sp>
-      <p:cxnSp>
-        <p:nvCxnSpPr>
-          <p:cNvPr id="42" name="Gerade Verbindung mit Pfeil 41">
+              <a:tailEnd type="triangle"/>
+            </a:ln>
+          </p:spPr>
+          <p:style>
+            <a:lnRef idx="1">
+              <a:schemeClr val="accent1"/>
+            </a:lnRef>
+            <a:fillRef idx="0">
+              <a:schemeClr val="accent1"/>
+            </a:fillRef>
+            <a:effectRef idx="0">
+              <a:schemeClr val="accent1"/>
+            </a:effectRef>
+            <a:fontRef idx="minor">
+              <a:schemeClr val="tx1"/>
+            </a:fontRef>
+          </p:style>
+        </p:cxnSp>
+        <p:cxnSp>
+          <p:nvCxnSpPr>
+            <p:cNvPr id="45" name="Gerade Verbindung mit Pfeil 44">
+              <a:extLst>
+                <a:ext uri="{FF2B5EF4-FFF2-40B4-BE49-F238E27FC236}">
+                  <a16:creationId xmlns:a16="http://schemas.microsoft.com/office/drawing/2014/main" id="{33E5F03F-2E0C-44F6-B9E8-6F4DD932B555}"/>
+                </a:ext>
+              </a:extLst>
+            </p:cNvPr>
+            <p:cNvCxnSpPr>
+              <a:cxnSpLocks/>
+              <a:stCxn id="39" idx="1"/>
+            </p:cNvCxnSpPr>
+            <p:nvPr/>
+          </p:nvCxnSpPr>
+          <p:spPr>
+            <a:xfrm flipH="1">
+              <a:off x="6703950" y="2275546"/>
+              <a:ext cx="582604" cy="1754767"/>
+            </a:xfrm>
+            <a:prstGeom prst="straightConnector1">
+              <a:avLst/>
+            </a:prstGeom>
+            <a:ln w="28575">
+              <a:solidFill>
+                <a:srgbClr val="E37222"/>
+              </a:solidFill>
+              <a:tailEnd type="triangle"/>
+            </a:ln>
+          </p:spPr>
+          <p:style>
+            <a:lnRef idx="1">
+              <a:schemeClr val="accent1"/>
+            </a:lnRef>
+            <a:fillRef idx="0">
+              <a:schemeClr val="accent1"/>
+            </a:fillRef>
+            <a:effectRef idx="0">
+              <a:schemeClr val="accent1"/>
+            </a:effectRef>
+            <a:fontRef idx="minor">
+              <a:schemeClr val="tx1"/>
+            </a:fontRef>
+          </p:style>
+        </p:cxnSp>
+      </p:grpSp>
+      <p:grpSp>
+        <p:nvGrpSpPr>
+          <p:cNvPr id="17" name="Gruppieren 16">
             <a:extLst>
               <a:ext uri="{FF2B5EF4-FFF2-40B4-BE49-F238E27FC236}">
-                <a16:creationId xmlns:a16="http://schemas.microsoft.com/office/drawing/2014/main" id="{4A8E720A-E1EC-4DF5-A205-14DAF71CA99B}"/>
+                <a16:creationId xmlns:a16="http://schemas.microsoft.com/office/drawing/2014/main" id="{159FCA97-8E34-4F87-849D-A822DB046B90}"/>
               </a:ext>
             </a:extLst>
           </p:cNvPr>
-          <p:cNvCxnSpPr>
-            <a:cxnSpLocks/>
-            <a:stCxn id="39" idx="1"/>
-          </p:cNvCxnSpPr>
+          <p:cNvGrpSpPr/>
           <p:nvPr/>
-        </p:nvCxnSpPr>
-        <p:spPr>
-          <a:xfrm flipH="1">
-            <a:off x="5027261" y="2275546"/>
-            <a:ext cx="1730303" cy="1039337"/>
+        </p:nvGrpSpPr>
+        <p:grpSpPr>
+          <a:xfrm>
+            <a:off x="241825" y="2764551"/>
+            <a:ext cx="8289597" cy="965013"/>
+            <a:chOff x="241825" y="2764551"/>
+            <a:chExt cx="8289597" cy="965013"/>
           </a:xfrm>
-          <a:prstGeom prst="straightConnector1">
-            <a:avLst/>
-          </a:prstGeom>
-          <a:ln w="28575">
-            <a:solidFill>
-              <a:srgbClr val="E37222"/>
-            </a:solidFill>
-            <a:tailEnd type="triangle"/>
-          </a:ln>
-        </p:spPr>
-        <p:style>
-          <a:lnRef idx="1">
-            <a:schemeClr val="accent1"/>
-          </a:lnRef>
-          <a:fillRef idx="0">
-            <a:schemeClr val="accent1"/>
-          </a:fillRef>
-          <a:effectRef idx="0">
-            <a:schemeClr val="accent1"/>
-          </a:effectRef>
-          <a:fontRef idx="minor">
-            <a:schemeClr val="tx1"/>
-          </a:fontRef>
-        </p:style>
-      </p:cxnSp>
-      <p:cxnSp>
-        <p:nvCxnSpPr>
-          <p:cNvPr id="45" name="Gerade Verbindung mit Pfeil 44">
-            <a:extLst>
-              <a:ext uri="{FF2B5EF4-FFF2-40B4-BE49-F238E27FC236}">
-                <a16:creationId xmlns:a16="http://schemas.microsoft.com/office/drawing/2014/main" id="{33E5F03F-2E0C-44F6-B9E8-6F4DD932B555}"/>
-              </a:ext>
-            </a:extLst>
-          </p:cNvPr>
-          <p:cNvCxnSpPr>
-            <a:cxnSpLocks/>
-            <a:stCxn id="39" idx="1"/>
-          </p:cNvCxnSpPr>
-          <p:nvPr/>
-        </p:nvCxnSpPr>
-        <p:spPr>
-          <a:xfrm flipH="1">
-            <a:off x="6174960" y="2275546"/>
-            <a:ext cx="582604" cy="1754767"/>
-          </a:xfrm>
-          <a:prstGeom prst="straightConnector1">
-            <a:avLst/>
-          </a:prstGeom>
-          <a:ln w="28575">
-            <a:solidFill>
-              <a:srgbClr val="E37222"/>
-            </a:solidFill>
-            <a:tailEnd type="triangle"/>
-          </a:ln>
-        </p:spPr>
-        <p:style>
-          <a:lnRef idx="1">
-            <a:schemeClr val="accent1"/>
-          </a:lnRef>
-          <a:fillRef idx="0">
-            <a:schemeClr val="accent1"/>
-          </a:fillRef>
-          <a:effectRef idx="0">
-            <a:schemeClr val="accent1"/>
-          </a:effectRef>
-          <a:fontRef idx="minor">
-            <a:schemeClr val="tx1"/>
-          </a:fontRef>
-        </p:style>
-      </p:cxnSp>
+        </p:grpSpPr>
+        <p:sp>
+          <p:nvSpPr>
+            <p:cNvPr id="22" name="Rechteck 21">
+              <a:extLst>
+                <a:ext uri="{FF2B5EF4-FFF2-40B4-BE49-F238E27FC236}">
+                  <a16:creationId xmlns:a16="http://schemas.microsoft.com/office/drawing/2014/main" id="{8CB83EF0-5086-40C2-AA1E-8048EDE1A8EF}"/>
+                </a:ext>
+              </a:extLst>
+            </p:cNvPr>
+            <p:cNvSpPr/>
+            <p:nvPr/>
+          </p:nvSpPr>
+          <p:spPr>
+            <a:xfrm>
+              <a:off x="241825" y="2764551"/>
+              <a:ext cx="1619353" cy="461665"/>
+            </a:xfrm>
+            <a:prstGeom prst="rect">
+              <a:avLst/>
+            </a:prstGeom>
+            <a:noFill/>
+          </p:spPr>
+          <p:txBody>
+            <a:bodyPr wrap="none" lIns="91440" tIns="45720" rIns="91440" bIns="45720">
+              <a:spAutoFit/>
+            </a:bodyPr>
+            <a:lstStyle/>
+            <a:p>
+              <a:pPr algn="ctr"/>
+              <a:r>
+                <a:rPr lang="de-DE" sz="2400" b="1" cap="none" spc="0" dirty="0">
+                  <a:ln w="0">
+                    <a:solidFill>
+                      <a:srgbClr val="DAD7CB"/>
+                    </a:solidFill>
+                  </a:ln>
+                  <a:solidFill>
+                    <a:srgbClr val="E37222"/>
+                  </a:solidFill>
+                  <a:effectLst>
+                    <a:outerShdw blurRad="38100" dist="25400" dir="5400000" algn="ctr" rotWithShape="0">
+                      <a:srgbClr val="6E747A">
+                        <a:alpha val="43000"/>
+                      </a:srgbClr>
+                    </a:outerShdw>
+                  </a:effectLst>
+                </a:rPr>
+                <a:t>Front-end</a:t>
+              </a:r>
+              <a:endParaRPr lang="de-DE" sz="4400" b="1" cap="none" spc="0" dirty="0">
+                <a:ln w="0">
+                  <a:solidFill>
+                    <a:srgbClr val="DAD7CB"/>
+                  </a:solidFill>
+                </a:ln>
+                <a:solidFill>
+                  <a:srgbClr val="E37222"/>
+                </a:solidFill>
+                <a:effectLst>
+                  <a:outerShdw blurRad="38100" dist="25400" dir="5400000" algn="ctr" rotWithShape="0">
+                    <a:srgbClr val="6E747A">
+                      <a:alpha val="43000"/>
+                    </a:srgbClr>
+                  </a:outerShdw>
+                </a:effectLst>
+              </a:endParaRPr>
+            </a:p>
+          </p:txBody>
+        </p:sp>
+        <p:sp>
+          <p:nvSpPr>
+            <p:cNvPr id="25" name="Rechteck 24">
+              <a:extLst>
+                <a:ext uri="{FF2B5EF4-FFF2-40B4-BE49-F238E27FC236}">
+                  <a16:creationId xmlns:a16="http://schemas.microsoft.com/office/drawing/2014/main" id="{7E180CDF-9237-4732-A4E8-29406C4E43E0}"/>
+                </a:ext>
+              </a:extLst>
+            </p:cNvPr>
+            <p:cNvSpPr/>
+            <p:nvPr/>
+          </p:nvSpPr>
+          <p:spPr>
+            <a:xfrm>
+              <a:off x="241825" y="3267899"/>
+              <a:ext cx="1571264" cy="461665"/>
+            </a:xfrm>
+            <a:prstGeom prst="rect">
+              <a:avLst/>
+            </a:prstGeom>
+            <a:noFill/>
+          </p:spPr>
+          <p:txBody>
+            <a:bodyPr wrap="none" lIns="91440" tIns="45720" rIns="91440" bIns="45720">
+              <a:spAutoFit/>
+            </a:bodyPr>
+            <a:lstStyle/>
+            <a:p>
+              <a:pPr algn="ctr"/>
+              <a:r>
+                <a:rPr lang="de-DE" sz="2400" b="1" cap="none" spc="0" dirty="0">
+                  <a:ln w="0">
+                    <a:solidFill>
+                      <a:srgbClr val="DAD7CB"/>
+                    </a:solidFill>
+                  </a:ln>
+                  <a:solidFill>
+                    <a:srgbClr val="E37222"/>
+                  </a:solidFill>
+                  <a:effectLst>
+                    <a:outerShdw blurRad="38100" dist="25400" dir="5400000" algn="ctr" rotWithShape="0">
+                      <a:srgbClr val="6E747A">
+                        <a:alpha val="43000"/>
+                      </a:srgbClr>
+                    </a:outerShdw>
+                  </a:effectLst>
+                </a:rPr>
+                <a:t>Back-end</a:t>
+              </a:r>
+              <a:endParaRPr lang="de-DE" sz="4400" b="1" cap="none" spc="0" dirty="0">
+                <a:ln w="0">
+                  <a:solidFill>
+                    <a:srgbClr val="DAD7CB"/>
+                  </a:solidFill>
+                </a:ln>
+                <a:solidFill>
+                  <a:srgbClr val="E37222"/>
+                </a:solidFill>
+                <a:effectLst>
+                  <a:outerShdw blurRad="38100" dist="25400" dir="5400000" algn="ctr" rotWithShape="0">
+                    <a:srgbClr val="6E747A">
+                      <a:alpha val="43000"/>
+                    </a:srgbClr>
+                  </a:outerShdw>
+                </a:effectLst>
+              </a:endParaRPr>
+            </a:p>
+          </p:txBody>
+        </p:sp>
+        <p:cxnSp>
+          <p:nvCxnSpPr>
+            <p:cNvPr id="15" name="Gerader Verbinder 14">
+              <a:extLst>
+                <a:ext uri="{FF2B5EF4-FFF2-40B4-BE49-F238E27FC236}">
+                  <a16:creationId xmlns:a16="http://schemas.microsoft.com/office/drawing/2014/main" id="{C115CB39-4052-40BF-8BCF-4A0226F6A327}"/>
+                </a:ext>
+              </a:extLst>
+            </p:cNvPr>
+            <p:cNvCxnSpPr/>
+            <p:nvPr/>
+          </p:nvCxnSpPr>
+          <p:spPr>
+            <a:xfrm>
+              <a:off x="339607" y="3254170"/>
+              <a:ext cx="8191815" cy="0"/>
+            </a:xfrm>
+            <a:prstGeom prst="line">
+              <a:avLst/>
+            </a:prstGeom>
+            <a:ln w="28575">
+              <a:solidFill>
+                <a:srgbClr val="E37222"/>
+              </a:solidFill>
+            </a:ln>
+          </p:spPr>
+          <p:style>
+            <a:lnRef idx="1">
+              <a:schemeClr val="accent1"/>
+            </a:lnRef>
+            <a:fillRef idx="0">
+              <a:schemeClr val="accent1"/>
+            </a:fillRef>
+            <a:effectRef idx="0">
+              <a:schemeClr val="accent1"/>
+            </a:effectRef>
+            <a:fontRef idx="minor">
+              <a:schemeClr val="tx1"/>
+            </a:fontRef>
+          </p:style>
+        </p:cxnSp>
+      </p:grpSp>
     </p:spTree>
     <p:extLst>
       <p:ext uri="{BB962C8B-B14F-4D97-AF65-F5344CB8AC3E}">
@@ -30205,6 +31768,171 @@
   <p:clrMapOvr>
     <a:masterClrMapping/>
   </p:clrMapOvr>
+  <p:timing>
+    <p:tnLst>
+      <p:par>
+        <p:cTn id="1" dur="indefinite" restart="never" nodeType="tmRoot">
+          <p:childTnLst>
+            <p:seq concurrent="1" nextAc="seek">
+              <p:cTn id="2" dur="indefinite" nodeType="mainSeq">
+                <p:childTnLst>
+                  <p:par>
+                    <p:cTn id="3" fill="hold">
+                      <p:stCondLst>
+                        <p:cond delay="indefinite"/>
+                      </p:stCondLst>
+                      <p:childTnLst>
+                        <p:par>
+                          <p:cTn id="4" fill="hold">
+                            <p:stCondLst>
+                              <p:cond delay="0"/>
+                            </p:stCondLst>
+                            <p:childTnLst>
+                              <p:par>
+                                <p:cTn id="5" presetID="1" presetClass="entr" presetSubtype="0" fill="hold" nodeType="clickEffect">
+                                  <p:stCondLst>
+                                    <p:cond delay="0"/>
+                                  </p:stCondLst>
+                                  <p:childTnLst>
+                                    <p:set>
+                                      <p:cBhvr>
+                                        <p:cTn id="6" dur="1" fill="hold">
+                                          <p:stCondLst>
+                                            <p:cond delay="0"/>
+                                          </p:stCondLst>
+                                        </p:cTn>
+                                        <p:tgtEl>
+                                          <p:spTgt spid="17"/>
+                                        </p:tgtEl>
+                                        <p:attrNameLst>
+                                          <p:attrName>style.visibility</p:attrName>
+                                        </p:attrNameLst>
+                                      </p:cBhvr>
+                                      <p:to>
+                                        <p:strVal val="visible"/>
+                                      </p:to>
+                                    </p:set>
+                                  </p:childTnLst>
+                                </p:cTn>
+                              </p:par>
+                            </p:childTnLst>
+                          </p:cTn>
+                        </p:par>
+                      </p:childTnLst>
+                    </p:cTn>
+                  </p:par>
+                  <p:par>
+                    <p:cTn id="7" fill="hold">
+                      <p:stCondLst>
+                        <p:cond delay="indefinite"/>
+                      </p:stCondLst>
+                      <p:childTnLst>
+                        <p:par>
+                          <p:cTn id="8" fill="hold">
+                            <p:stCondLst>
+                              <p:cond delay="0"/>
+                            </p:stCondLst>
+                            <p:childTnLst>
+                              <p:par>
+                                <p:cTn id="9" presetID="1" presetClass="exit" presetSubtype="0" fill="hold" nodeType="clickEffect">
+                                  <p:stCondLst>
+                                    <p:cond delay="0"/>
+                                  </p:stCondLst>
+                                  <p:childTnLst>
+                                    <p:set>
+                                      <p:cBhvr>
+                                        <p:cTn id="10" dur="1" fill="hold">
+                                          <p:stCondLst>
+                                            <p:cond delay="0"/>
+                                          </p:stCondLst>
+                                        </p:cTn>
+                                        <p:tgtEl>
+                                          <p:spTgt spid="17"/>
+                                        </p:tgtEl>
+                                        <p:attrNameLst>
+                                          <p:attrName>style.visibility</p:attrName>
+                                        </p:attrNameLst>
+                                      </p:cBhvr>
+                                      <p:to>
+                                        <p:strVal val="hidden"/>
+                                      </p:to>
+                                    </p:set>
+                                  </p:childTnLst>
+                                </p:cTn>
+                              </p:par>
+                            </p:childTnLst>
+                          </p:cTn>
+                        </p:par>
+                      </p:childTnLst>
+                    </p:cTn>
+                  </p:par>
+                  <p:par>
+                    <p:cTn id="11" fill="hold">
+                      <p:stCondLst>
+                        <p:cond delay="indefinite"/>
+                      </p:stCondLst>
+                      <p:childTnLst>
+                        <p:par>
+                          <p:cTn id="12" fill="hold">
+                            <p:stCondLst>
+                              <p:cond delay="0"/>
+                            </p:stCondLst>
+                            <p:childTnLst>
+                              <p:par>
+                                <p:cTn id="13" presetID="1" presetClass="entr" presetSubtype="0" fill="hold" nodeType="clickEffect">
+                                  <p:stCondLst>
+                                    <p:cond delay="0"/>
+                                  </p:stCondLst>
+                                  <p:childTnLst>
+                                    <p:set>
+                                      <p:cBhvr>
+                                        <p:cTn id="14" dur="1" fill="hold">
+                                          <p:stCondLst>
+                                            <p:cond delay="0"/>
+                                          </p:stCondLst>
+                                        </p:cTn>
+                                        <p:tgtEl>
+                                          <p:spTgt spid="19"/>
+                                        </p:tgtEl>
+                                        <p:attrNameLst>
+                                          <p:attrName>style.visibility</p:attrName>
+                                        </p:attrNameLst>
+                                      </p:cBhvr>
+                                      <p:to>
+                                        <p:strVal val="visible"/>
+                                      </p:to>
+                                    </p:set>
+                                  </p:childTnLst>
+                                </p:cTn>
+                              </p:par>
+                            </p:childTnLst>
+                          </p:cTn>
+                        </p:par>
+                      </p:childTnLst>
+                    </p:cTn>
+                  </p:par>
+                </p:childTnLst>
+              </p:cTn>
+              <p:prevCondLst>
+                <p:cond evt="onPrev" delay="0">
+                  <p:tgtEl>
+                    <p:sldTgt/>
+                  </p:tgtEl>
+                </p:cond>
+              </p:prevCondLst>
+              <p:nextCondLst>
+                <p:cond evt="onNext" delay="0">
+                  <p:tgtEl>
+                    <p:sldTgt/>
+                  </p:tgtEl>
+                </p:cond>
+              </p:nextCondLst>
+            </p:seq>
+          </p:childTnLst>
+        </p:cTn>
+      </p:par>
+    </p:tnLst>
+  </p:timing>
 </p:sld>
 </file>
 

</xml_diff>

<commit_message>
this is the last version
</commit_message>
<xml_diff>
--- a/pres/Final_Presentation_V02.pptx
+++ b/pres/Final_Presentation_V02.pptx
@@ -23482,6 +23482,33 @@
                                   </p:childTnLst>
                                 </p:cTn>
                               </p:par>
+                              <p:par>
+                                <p:cTn id="9" presetID="1" presetClass="entr" presetSubtype="0" fill="hold" grpId="0" nodeType="withEffect">
+                                  <p:stCondLst>
+                                    <p:cond delay="0"/>
+                                  </p:stCondLst>
+                                  <p:childTnLst>
+                                    <p:set>
+                                      <p:cBhvr>
+                                        <p:cTn id="10" dur="1" fill="hold">
+                                          <p:stCondLst>
+                                            <p:cond delay="0"/>
+                                          </p:stCondLst>
+                                        </p:cTn>
+                                        <p:tgtEl>
+                                          <p:spTgt spid="4"/>
+                                        </p:tgtEl>
+                                        <p:attrNameLst>
+                                          <p:attrName>style.visibility</p:attrName>
+                                        </p:attrNameLst>
+                                      </p:cBhvr>
+                                      <p:to>
+                                        <p:strVal val="visible"/>
+                                      </p:to>
+                                    </p:set>
+                                  </p:childTnLst>
+                                </p:cTn>
+                              </p:par>
                             </p:childTnLst>
                           </p:cTn>
                         </p:par>
@@ -23507,7 +23534,7 @@
             </p:seq>
             <p:audio>
               <p:cMediaNode vol="80000">
-                <p:cTn id="9" fill="hold" display="0">
+                <p:cTn id="11" fill="hold" display="0">
                   <p:stCondLst>
                     <p:cond delay="indefinite"/>
                   </p:stCondLst>
@@ -23528,6 +23555,9 @@
         </p:cTn>
       </p:par>
     </p:tnLst>
+    <p:bldLst>
+      <p:bldP spid="4" grpId="0"/>
+    </p:bldLst>
   </p:timing>
 </p:sld>
 </file>
@@ -23768,6 +23798,33 @@
                                   </p:childTnLst>
                                 </p:cTn>
                               </p:par>
+                              <p:par>
+                                <p:cTn id="9" presetID="1" presetClass="entr" presetSubtype="0" fill="hold" grpId="0" nodeType="withEffect">
+                                  <p:stCondLst>
+                                    <p:cond delay="0"/>
+                                  </p:stCondLst>
+                                  <p:childTnLst>
+                                    <p:set>
+                                      <p:cBhvr>
+                                        <p:cTn id="10" dur="1" fill="hold">
+                                          <p:stCondLst>
+                                            <p:cond delay="0"/>
+                                          </p:stCondLst>
+                                        </p:cTn>
+                                        <p:tgtEl>
+                                          <p:spTgt spid="10"/>
+                                        </p:tgtEl>
+                                        <p:attrNameLst>
+                                          <p:attrName>style.visibility</p:attrName>
+                                        </p:attrNameLst>
+                                      </p:cBhvr>
+                                      <p:to>
+                                        <p:strVal val="visible"/>
+                                      </p:to>
+                                    </p:set>
+                                  </p:childTnLst>
+                                </p:cTn>
+                              </p:par>
                             </p:childTnLst>
                           </p:cTn>
                         </p:par>
@@ -23793,7 +23850,7 @@
             </p:seq>
             <p:audio>
               <p:cMediaNode vol="80000">
-                <p:cTn id="9" fill="hold" display="0">
+                <p:cTn id="11" fill="hold" display="0">
                   <p:stCondLst>
                     <p:cond delay="indefinite"/>
                   </p:stCondLst>
@@ -23814,6 +23871,9 @@
         </p:cTn>
       </p:par>
     </p:tnLst>
+    <p:bldLst>
+      <p:bldP spid="10" grpId="0"/>
+    </p:bldLst>
   </p:timing>
 </p:sld>
 </file>

</xml_diff>